<commit_message>
Actualizacion de ppt. No es final
</commit_message>
<xml_diff>
--- a/docs/PresentacionFebrero2011/PresentacionFebrero2011Tempore.pptx
+++ b/docs/PresentacionFebrero2011/PresentacionFebrero2011Tempore.pptx
@@ -10,16 +10,16 @@
   <p:sldIdLst>
     <p:sldId id="256" r:id="rId2"/>
     <p:sldId id="257" r:id="rId3"/>
-    <p:sldId id="258" r:id="rId4"/>
-    <p:sldId id="259" r:id="rId5"/>
-    <p:sldId id="260" r:id="rId6"/>
-    <p:sldId id="261" r:id="rId7"/>
-    <p:sldId id="262" r:id="rId8"/>
-    <p:sldId id="263" r:id="rId9"/>
-    <p:sldId id="264" r:id="rId10"/>
+    <p:sldId id="269" r:id="rId4"/>
+    <p:sldId id="258" r:id="rId5"/>
+    <p:sldId id="259" r:id="rId6"/>
+    <p:sldId id="260" r:id="rId7"/>
+    <p:sldId id="261" r:id="rId8"/>
+    <p:sldId id="262" r:id="rId9"/>
+    <p:sldId id="263" r:id="rId10"/>
     <p:sldId id="265" r:id="rId11"/>
-    <p:sldId id="266" r:id="rId12"/>
-    <p:sldId id="267" r:id="rId13"/>
+    <p:sldId id="267" r:id="rId12"/>
+    <p:sldId id="264" r:id="rId13"/>
     <p:sldId id="268" r:id="rId14"/>
   </p:sldIdLst>
   <p:sldSz cx="9144000" cy="6858000" type="screen4x3"/>
@@ -204,7 +204,8 @@
           <a:p>
             <a:fld id="{65661453-07E7-4AEE-9C8B-29A6A2DCAFF7}" type="datetimeFigureOut">
               <a:rPr lang="en-US" smtClean="0"/>
-              <a:t>2/10/2011</a:t>
+              <a:pPr/>
+              <a:t>2/14/2011</a:t>
             </a:fld>
             <a:endParaRPr lang="en-US"/>
           </a:p>
@@ -365,6 +366,7 @@
           <a:p>
             <a:fld id="{63BD0AB3-A2A6-4E79-9891-25E3EC99699D}" type="slidenum">
               <a:rPr lang="en-US" smtClean="0"/>
+              <a:pPr/>
               <a:t>‹#›</a:t>
             </a:fld>
             <a:endParaRPr lang="en-US"/>
@@ -666,7 +668,8 @@
           <a:p>
             <a:fld id="{63BD0AB3-A2A6-4E79-9891-25E3EC99699D}" type="slidenum">
               <a:rPr lang="en-US" smtClean="0"/>
-              <a:t>3</a:t>
+              <a:pPr/>
+              <a:t>4</a:t>
             </a:fld>
             <a:endParaRPr lang="en-US"/>
           </a:p>
@@ -806,7 +809,8 @@
           <a:p>
             <a:fld id="{98D19233-7ADB-4551-A0BD-D8F24960C1E4}" type="datetimeFigureOut">
               <a:rPr lang="en-US" smtClean="0"/>
-              <a:t>2/10/2011</a:t>
+              <a:pPr/>
+              <a:t>2/14/2011</a:t>
             </a:fld>
             <a:endParaRPr lang="en-US"/>
           </a:p>
@@ -856,6 +860,7 @@
           <a:p>
             <a:fld id="{B53DA751-7C3C-44D8-9791-553A04B31189}" type="slidenum">
               <a:rPr lang="en-US" smtClean="0"/>
+              <a:pPr/>
               <a:t>‹#›</a:t>
             </a:fld>
             <a:endParaRPr lang="en-US"/>
@@ -983,7 +988,8 @@
           <a:p>
             <a:fld id="{98D19233-7ADB-4551-A0BD-D8F24960C1E4}" type="datetimeFigureOut">
               <a:rPr lang="en-US" smtClean="0"/>
-              <a:t>2/10/2011</a:t>
+              <a:pPr/>
+              <a:t>2/14/2011</a:t>
             </a:fld>
             <a:endParaRPr lang="en-US"/>
           </a:p>
@@ -1033,6 +1039,7 @@
           <a:p>
             <a:fld id="{B53DA751-7C3C-44D8-9791-553A04B31189}" type="slidenum">
               <a:rPr lang="en-US" smtClean="0"/>
+              <a:pPr/>
               <a:t>‹#›</a:t>
             </a:fld>
             <a:endParaRPr lang="en-US"/>
@@ -1170,7 +1177,8 @@
           <a:p>
             <a:fld id="{98D19233-7ADB-4551-A0BD-D8F24960C1E4}" type="datetimeFigureOut">
               <a:rPr lang="en-US" smtClean="0"/>
-              <a:t>2/10/2011</a:t>
+              <a:pPr/>
+              <a:t>2/14/2011</a:t>
             </a:fld>
             <a:endParaRPr lang="en-US"/>
           </a:p>
@@ -1220,6 +1228,7 @@
           <a:p>
             <a:fld id="{B53DA751-7C3C-44D8-9791-553A04B31189}" type="slidenum">
               <a:rPr lang="en-US" smtClean="0"/>
+              <a:pPr/>
               <a:t>‹#›</a:t>
             </a:fld>
             <a:endParaRPr lang="en-US"/>
@@ -1347,7 +1356,8 @@
           <a:p>
             <a:fld id="{98D19233-7ADB-4551-A0BD-D8F24960C1E4}" type="datetimeFigureOut">
               <a:rPr lang="en-US" smtClean="0"/>
-              <a:t>2/10/2011</a:t>
+              <a:pPr/>
+              <a:t>2/14/2011</a:t>
             </a:fld>
             <a:endParaRPr lang="en-US"/>
           </a:p>
@@ -1397,6 +1407,7 @@
           <a:p>
             <a:fld id="{B53DA751-7C3C-44D8-9791-553A04B31189}" type="slidenum">
               <a:rPr lang="en-US" smtClean="0"/>
+              <a:pPr/>
               <a:t>‹#›</a:t>
             </a:fld>
             <a:endParaRPr lang="en-US"/>
@@ -1546,7 +1557,8 @@
           <a:p>
             <a:fld id="{98D19233-7ADB-4551-A0BD-D8F24960C1E4}" type="datetimeFigureOut">
               <a:rPr lang="en-US" smtClean="0"/>
-              <a:t>2/10/2011</a:t>
+              <a:pPr/>
+              <a:t>2/14/2011</a:t>
             </a:fld>
             <a:endParaRPr lang="en-US"/>
           </a:p>
@@ -1596,6 +1608,7 @@
           <a:p>
             <a:fld id="{B53DA751-7C3C-44D8-9791-553A04B31189}" type="slidenum">
               <a:rPr lang="en-US" smtClean="0"/>
+              <a:pPr/>
               <a:t>‹#›</a:t>
             </a:fld>
             <a:endParaRPr lang="en-US"/>
@@ -1841,7 +1854,8 @@
           <a:p>
             <a:fld id="{98D19233-7ADB-4551-A0BD-D8F24960C1E4}" type="datetimeFigureOut">
               <a:rPr lang="en-US" smtClean="0"/>
-              <a:t>2/10/2011</a:t>
+              <a:pPr/>
+              <a:t>2/14/2011</a:t>
             </a:fld>
             <a:endParaRPr lang="en-US"/>
           </a:p>
@@ -1891,6 +1905,7 @@
           <a:p>
             <a:fld id="{B53DA751-7C3C-44D8-9791-553A04B31189}" type="slidenum">
               <a:rPr lang="en-US" smtClean="0"/>
+              <a:pPr/>
               <a:t>‹#›</a:t>
             </a:fld>
             <a:endParaRPr lang="en-US"/>
@@ -2275,7 +2290,8 @@
           <a:p>
             <a:fld id="{98D19233-7ADB-4551-A0BD-D8F24960C1E4}" type="datetimeFigureOut">
               <a:rPr lang="en-US" smtClean="0"/>
-              <a:t>2/10/2011</a:t>
+              <a:pPr/>
+              <a:t>2/14/2011</a:t>
             </a:fld>
             <a:endParaRPr lang="en-US"/>
           </a:p>
@@ -2325,6 +2341,7 @@
           <a:p>
             <a:fld id="{B53DA751-7C3C-44D8-9791-553A04B31189}" type="slidenum">
               <a:rPr lang="en-US" smtClean="0"/>
+              <a:pPr/>
               <a:t>‹#›</a:t>
             </a:fld>
             <a:endParaRPr lang="en-US"/>
@@ -2400,7 +2417,8 @@
           <a:p>
             <a:fld id="{98D19233-7ADB-4551-A0BD-D8F24960C1E4}" type="datetimeFigureOut">
               <a:rPr lang="en-US" smtClean="0"/>
-              <a:t>2/10/2011</a:t>
+              <a:pPr/>
+              <a:t>2/14/2011</a:t>
             </a:fld>
             <a:endParaRPr lang="en-US"/>
           </a:p>
@@ -2450,6 +2468,7 @@
           <a:p>
             <a:fld id="{B53DA751-7C3C-44D8-9791-553A04B31189}" type="slidenum">
               <a:rPr lang="en-US" smtClean="0"/>
+              <a:pPr/>
               <a:t>‹#›</a:t>
             </a:fld>
             <a:endParaRPr lang="en-US"/>
@@ -2502,7 +2521,8 @@
           <a:p>
             <a:fld id="{98D19233-7ADB-4551-A0BD-D8F24960C1E4}" type="datetimeFigureOut">
               <a:rPr lang="en-US" smtClean="0"/>
-              <a:t>2/10/2011</a:t>
+              <a:pPr/>
+              <a:t>2/14/2011</a:t>
             </a:fld>
             <a:endParaRPr lang="en-US"/>
           </a:p>
@@ -2552,6 +2572,7 @@
           <a:p>
             <a:fld id="{B53DA751-7C3C-44D8-9791-553A04B31189}" type="slidenum">
               <a:rPr lang="en-US" smtClean="0"/>
+              <a:pPr/>
               <a:t>‹#›</a:t>
             </a:fld>
             <a:endParaRPr lang="en-US"/>
@@ -2786,7 +2807,8 @@
           <a:p>
             <a:fld id="{98D19233-7ADB-4551-A0BD-D8F24960C1E4}" type="datetimeFigureOut">
               <a:rPr lang="en-US" smtClean="0"/>
-              <a:t>2/10/2011</a:t>
+              <a:pPr/>
+              <a:t>2/14/2011</a:t>
             </a:fld>
             <a:endParaRPr lang="en-US"/>
           </a:p>
@@ -2836,6 +2858,7 @@
           <a:p>
             <a:fld id="{B53DA751-7C3C-44D8-9791-553A04B31189}" type="slidenum">
               <a:rPr lang="en-US" smtClean="0"/>
+              <a:pPr/>
               <a:t>‹#›</a:t>
             </a:fld>
             <a:endParaRPr lang="en-US"/>
@@ -3050,7 +3073,8 @@
           <a:p>
             <a:fld id="{98D19233-7ADB-4551-A0BD-D8F24960C1E4}" type="datetimeFigureOut">
               <a:rPr lang="en-US" smtClean="0"/>
-              <a:t>2/10/2011</a:t>
+              <a:pPr/>
+              <a:t>2/14/2011</a:t>
             </a:fld>
             <a:endParaRPr lang="en-US"/>
           </a:p>
@@ -3100,6 +3124,7 @@
           <a:p>
             <a:fld id="{B53DA751-7C3C-44D8-9791-553A04B31189}" type="slidenum">
               <a:rPr lang="en-US" smtClean="0"/>
+              <a:pPr/>
               <a:t>‹#›</a:t>
             </a:fld>
             <a:endParaRPr lang="en-US"/>
@@ -3300,7 +3325,8 @@
           <a:p>
             <a:fld id="{98D19233-7ADB-4551-A0BD-D8F24960C1E4}" type="datetimeFigureOut">
               <a:rPr lang="en-US" smtClean="0"/>
-              <a:t>2/10/2011</a:t>
+              <a:pPr/>
+              <a:t>2/14/2011</a:t>
             </a:fld>
             <a:endParaRPr lang="en-US"/>
           </a:p>
@@ -3390,6 +3416,7 @@
           <a:p>
             <a:fld id="{B53DA751-7C3C-44D8-9791-553A04B31189}" type="slidenum">
               <a:rPr lang="en-US" smtClean="0"/>
+              <a:pPr/>
               <a:t>‹#›</a:t>
             </a:fld>
             <a:endParaRPr lang="en-US"/>
@@ -3904,10 +3931,10 @@
           <a:lstStyle/>
           <a:p>
             <a:r>
-              <a:rPr lang="es-ES" dirty="0" smtClean="0"/>
+              <a:rPr lang="es-ES" b="1" dirty="0" smtClean="0"/>
               <a:t>Tempore</a:t>
             </a:r>
-            <a:endParaRPr lang="en-US" dirty="0"/>
+            <a:endParaRPr lang="en-US" b="1" dirty="0"/>
           </a:p>
         </p:txBody>
       </p:sp>
@@ -4045,2873 +4072,160 @@
       </p:grpSpPr>
       <p:sp>
         <p:nvSpPr>
-          <p:cNvPr id="2050" name="Rectangle 2"/>
-          <p:cNvSpPr>
-            <a:spLocks noChangeArrowheads="1"/>
-          </p:cNvSpPr>
-          <p:nvPr/>
-        </p:nvSpPr>
-        <p:spPr bwMode="auto">
-          <a:xfrm>
-            <a:off x="0" y="0"/>
-            <a:ext cx="9144000" cy="0"/>
-          </a:xfrm>
-          <a:prstGeom prst="rect">
-            <a:avLst/>
-          </a:prstGeom>
-          <a:noFill/>
-          <a:ln w="12700" cap="sq" cmpd="sng">
-            <a:noFill/>
-            <a:prstDash val="solid"/>
-            <a:miter lim="800000"/>
-            <a:headEnd type="none" w="sm" len="sm"/>
-            <a:tailEnd type="none" w="sm" len="sm"/>
-          </a:ln>
-          <a:effectLst/>
-        </p:spPr>
-        <p:txBody>
-          <a:bodyPr vert="horz" wrap="none" lIns="91440" tIns="45720" rIns="91440" bIns="45720" numCol="1" anchor="ctr" anchorCtr="0" compatLnSpc="1">
-            <a:prstTxWarp prst="textNoShape">
-              <a:avLst/>
-            </a:prstTxWarp>
-            <a:spAutoFit/>
-          </a:bodyPr>
+          <p:cNvPr id="2" name="Title 1"/>
+          <p:cNvSpPr>
+            <a:spLocks noGrp="1"/>
+          </p:cNvSpPr>
+          <p:nvPr>
+            <p:ph type="title"/>
+          </p:nvPr>
+        </p:nvSpPr>
+        <p:spPr/>
+        <p:txBody>
+          <a:bodyPr/>
           <a:lstStyle/>
           <a:p>
-            <a:endParaRPr lang="en-US"/>
-          </a:p>
-        </p:txBody>
-      </p:sp>
-      <p:sp>
-        <p:nvSpPr>
-          <p:cNvPr id="2084" name="Rectangle 36"/>
-          <p:cNvSpPr>
-            <a:spLocks noChangeArrowheads="1"/>
-          </p:cNvSpPr>
-          <p:nvPr/>
-        </p:nvSpPr>
-        <p:spPr bwMode="auto">
-          <a:xfrm>
-            <a:off x="0" y="-56093"/>
-            <a:ext cx="65" cy="569387"/>
-          </a:xfrm>
-          <a:prstGeom prst="rect">
-            <a:avLst/>
-          </a:prstGeom>
-          <a:noFill/>
-          <a:ln w="12700" cap="sq" cmpd="sng">
-            <a:noFill/>
-            <a:prstDash val="solid"/>
-            <a:miter lim="800000"/>
-            <a:headEnd type="none" w="sm" len="sm"/>
-            <a:tailEnd type="none" w="sm" len="sm"/>
-          </a:ln>
-          <a:effectLst/>
-        </p:spPr>
-        <p:txBody>
-          <a:bodyPr vert="horz" wrap="none" lIns="0" tIns="45720" rIns="0" bIns="45720" numCol="1" anchor="ctr" anchorCtr="0" compatLnSpc="1">
-            <a:prstTxWarp prst="textNoShape">
-              <a:avLst/>
-            </a:prstTxWarp>
-            <a:spAutoFit/>
-          </a:bodyPr>
+            <a:r>
+              <a:rPr lang="es-ES" dirty="0" smtClean="0"/>
+              <a:t>Tecnología</a:t>
+            </a:r>
+            <a:endParaRPr lang="en-US" dirty="0"/>
+          </a:p>
+        </p:txBody>
+      </p:sp>
+      <p:sp>
+        <p:nvSpPr>
+          <p:cNvPr id="3" name="Content Placeholder 2"/>
+          <p:cNvSpPr>
+            <a:spLocks noGrp="1"/>
+          </p:cNvSpPr>
+          <p:nvPr>
+            <p:ph idx="1"/>
+          </p:nvPr>
+        </p:nvSpPr>
+        <p:spPr/>
+        <p:txBody>
+          <a:bodyPr/>
           <a:lstStyle/>
           <a:p>
-            <a:pPr marL="0" marR="0" lvl="0" indent="0" algn="l" defTabSz="914400" rtl="0" eaLnBrk="1" fontAlgn="base" latinLnBrk="0" hangingPunct="1">
-              <a:lnSpc>
-                <a:spcPct val="100000"/>
-              </a:lnSpc>
-              <a:spcBef>
-                <a:spcPct val="0"/>
-              </a:spcBef>
-              <a:spcAft>
-                <a:spcPct val="0"/>
-              </a:spcAft>
-              <a:buClrTx/>
-              <a:buSzTx/>
-              <a:buFontTx/>
-              <a:buNone/>
-              <a:tabLst/>
-            </a:pPr>
-            <a:endParaRPr kumimoji="0" lang="es-ES" sz="1300" b="1" i="0" u="none" strike="noStrike" cap="none" normalizeH="0" baseline="0" dirty="0" smtClean="0">
-              <a:ln>
-                <a:noFill/>
-              </a:ln>
-              <a:solidFill>
-                <a:schemeClr val="tx1"/>
-              </a:solidFill>
-              <a:effectLst/>
-              <a:latin typeface="Times New Roman" pitchFamily="18" charset="0"/>
-              <a:cs typeface="Times New Roman" pitchFamily="18" charset="0"/>
-            </a:endParaRPr>
-          </a:p>
-          <a:p>
-            <a:pPr marL="0" marR="0" lvl="0" indent="0" algn="l" defTabSz="914400" rtl="0" eaLnBrk="0" fontAlgn="base" latinLnBrk="0" hangingPunct="0">
-              <a:lnSpc>
-                <a:spcPct val="100000"/>
-              </a:lnSpc>
-              <a:spcBef>
-                <a:spcPct val="0"/>
-              </a:spcBef>
-              <a:spcAft>
-                <a:spcPct val="0"/>
-              </a:spcAft>
-              <a:buClrTx/>
-              <a:buSzTx/>
-              <a:buFontTx/>
-              <a:buNone/>
-              <a:tabLst/>
-            </a:pPr>
-            <a:endParaRPr kumimoji="0" lang="es-ES" sz="1800" b="0" i="0" u="none" strike="noStrike" cap="none" normalizeH="0" baseline="0" dirty="0" smtClean="0">
-              <a:ln>
-                <a:noFill/>
-              </a:ln>
-              <a:solidFill>
-                <a:schemeClr val="tx1"/>
-              </a:solidFill>
-              <a:effectLst/>
-              <a:latin typeface="Arial" pitchFamily="34" charset="0"/>
-            </a:endParaRPr>
-          </a:p>
-        </p:txBody>
-      </p:sp>
-      <p:grpSp>
-        <p:nvGrpSpPr>
-          <p:cNvPr id="2051" name="Group 3"/>
-          <p:cNvGrpSpPr>
-            <a:grpSpLocks/>
-          </p:cNvGrpSpPr>
-          <p:nvPr/>
-        </p:nvGrpSpPr>
-        <p:grpSpPr bwMode="auto">
-          <a:xfrm>
-            <a:off x="2286000" y="128650"/>
-            <a:ext cx="5715000" cy="6711950"/>
-            <a:chOff x="1757" y="1694"/>
-            <a:chExt cx="8660" cy="11776"/>
-          </a:xfrm>
-        </p:grpSpPr>
-        <p:grpSp>
-          <p:nvGrpSpPr>
-            <p:cNvPr id="2061" name="Group 13"/>
-            <p:cNvGrpSpPr>
-              <a:grpSpLocks/>
-            </p:cNvGrpSpPr>
-            <p:nvPr/>
-          </p:nvGrpSpPr>
-          <p:grpSpPr bwMode="auto">
-            <a:xfrm>
-              <a:off x="1757" y="1694"/>
-              <a:ext cx="8660" cy="11776"/>
-              <a:chOff x="1757" y="1694"/>
-              <a:chExt cx="8660" cy="11776"/>
-            </a:xfrm>
-          </p:grpSpPr>
-          <p:grpSp>
-            <p:nvGrpSpPr>
-              <p:cNvPr id="2080" name="Group 32"/>
-              <p:cNvGrpSpPr>
-                <a:grpSpLocks/>
-              </p:cNvGrpSpPr>
-              <p:nvPr/>
-            </p:nvGrpSpPr>
-            <p:grpSpPr bwMode="auto">
-              <a:xfrm>
-                <a:off x="1945" y="1694"/>
-                <a:ext cx="5143" cy="2145"/>
-                <a:chOff x="1945" y="1694"/>
-                <a:chExt cx="5143" cy="2145"/>
-              </a:xfrm>
-            </p:grpSpPr>
-            <p:sp>
-              <p:nvSpPr>
-                <p:cNvPr id="2083" name="AutoShape 35"/>
-                <p:cNvSpPr>
-                  <a:spLocks noChangeArrowheads="1"/>
-                </p:cNvSpPr>
-                <p:nvPr/>
-              </p:nvSpPr>
-              <p:spPr bwMode="auto">
-                <a:xfrm>
-                  <a:off x="1945" y="1694"/>
-                  <a:ext cx="5143" cy="2145"/>
-                </a:xfrm>
-                <a:prstGeom prst="roundRect">
-                  <a:avLst>
-                    <a:gd name="adj" fmla="val 16667"/>
-                  </a:avLst>
-                </a:prstGeom>
-                <a:gradFill rotWithShape="0">
-                  <a:gsLst>
-                    <a:gs pos="0">
-                      <a:srgbClr val="FABF8F"/>
-                    </a:gs>
-                    <a:gs pos="50000">
-                      <a:srgbClr val="FDE9D9"/>
-                    </a:gs>
-                    <a:gs pos="100000">
-                      <a:srgbClr val="FABF8F"/>
-                    </a:gs>
-                  </a:gsLst>
-                  <a:lin ang="18900000" scaled="1"/>
-                </a:gradFill>
-                <a:ln w="12700">
-                  <a:solidFill>
-                    <a:srgbClr val="FABF8F"/>
-                  </a:solidFill>
-                  <a:round/>
-                  <a:headEnd/>
-                  <a:tailEnd/>
-                </a:ln>
-                <a:effectLst>
-                  <a:outerShdw dist="107763" dir="18900000" algn="ctr" rotWithShape="0">
-                    <a:srgbClr val="974706">
-                      <a:alpha val="50000"/>
-                    </a:srgbClr>
-                  </a:outerShdw>
-                </a:effectLst>
-              </p:spPr>
-              <p:txBody>
-                <a:bodyPr vert="horz" wrap="square" lIns="91440" tIns="45720" rIns="91440" bIns="45720" numCol="1" anchor="t" anchorCtr="0" compatLnSpc="1">
-                  <a:prstTxWarp prst="textNoShape">
-                    <a:avLst/>
-                  </a:prstTxWarp>
-                </a:bodyPr>
-                <a:lstStyle/>
-                <a:p>
-                  <a:pPr marL="0" marR="0" lvl="0" indent="0" algn="l" defTabSz="914400" rtl="0" eaLnBrk="1" fontAlgn="base" latinLnBrk="0" hangingPunct="1">
-                    <a:lnSpc>
-                      <a:spcPct val="100000"/>
-                    </a:lnSpc>
-                    <a:spcBef>
-                      <a:spcPct val="0"/>
-                    </a:spcBef>
-                    <a:spcAft>
-                      <a:spcPct val="0"/>
-                    </a:spcAft>
-                    <a:buClrTx/>
-                    <a:buSzTx/>
-                    <a:buFontTx/>
-                    <a:buNone/>
-                    <a:tabLst/>
-                  </a:pPr>
-                  <a:r>
-                    <a:rPr kumimoji="0" lang="es-AR" sz="1000" b="0" i="0" u="none" strike="noStrike" cap="none" normalizeH="0" baseline="0" smtClean="0">
-                      <a:ln>
-                        <a:noFill/>
-                      </a:ln>
-                      <a:solidFill>
-                        <a:schemeClr val="tx1"/>
-                      </a:solidFill>
-                      <a:effectLst/>
-                      <a:latin typeface="Arial" pitchFamily="34" charset="0"/>
-                      <a:ea typeface="Times New Roman" pitchFamily="18" charset="0"/>
-                      <a:cs typeface="Arial" pitchFamily="34" charset="0"/>
-                    </a:rPr>
-                    <a:t>&lt;View&gt; </a:t>
-                  </a:r>
-                  <a:endParaRPr kumimoji="0" lang="es-AR" sz="800" b="0" i="0" u="none" strike="noStrike" cap="none" normalizeH="0" baseline="0" smtClean="0">
-                    <a:ln>
-                      <a:noFill/>
-                    </a:ln>
-                    <a:solidFill>
-                      <a:schemeClr val="tx1"/>
-                    </a:solidFill>
-                    <a:effectLst/>
-                    <a:latin typeface="Arial" pitchFamily="34" charset="0"/>
-                  </a:endParaRPr>
-                </a:p>
-                <a:p>
-                  <a:pPr marL="0" marR="0" lvl="0" indent="0" algn="l" defTabSz="914400" rtl="0" eaLnBrk="0" fontAlgn="base" latinLnBrk="0" hangingPunct="0">
-                    <a:lnSpc>
-                      <a:spcPct val="100000"/>
-                    </a:lnSpc>
-                    <a:spcBef>
-                      <a:spcPct val="0"/>
-                    </a:spcBef>
-                    <a:spcAft>
-                      <a:spcPct val="0"/>
-                    </a:spcAft>
-                    <a:buClrTx/>
-                    <a:buSzTx/>
-                    <a:buFontTx/>
-                    <a:buNone/>
-                    <a:tabLst/>
-                  </a:pPr>
-                  <a:r>
-                    <a:rPr kumimoji="0" lang="es-AR" sz="1000" b="0" i="0" u="none" strike="noStrike" cap="none" normalizeH="0" baseline="0" smtClean="0">
-                      <a:ln>
-                        <a:noFill/>
-                      </a:ln>
-                      <a:solidFill>
-                        <a:schemeClr val="tx1"/>
-                      </a:solidFill>
-                      <a:effectLst/>
-                      <a:latin typeface="Arial" pitchFamily="34" charset="0"/>
-                      <a:ea typeface="Times New Roman" pitchFamily="18" charset="0"/>
-                      <a:cs typeface="Arial" pitchFamily="34" charset="0"/>
-                    </a:rPr>
-                    <a:t>Browser</a:t>
-                  </a:r>
-                  <a:endParaRPr kumimoji="0" lang="es-AR" sz="1800" b="0" i="0" u="none" strike="noStrike" cap="none" normalizeH="0" baseline="0" smtClean="0">
-                    <a:ln>
-                      <a:noFill/>
-                    </a:ln>
-                    <a:solidFill>
-                      <a:schemeClr val="tx1"/>
-                    </a:solidFill>
-                    <a:effectLst/>
-                    <a:latin typeface="Arial" pitchFamily="34" charset="0"/>
-                  </a:endParaRPr>
-                </a:p>
-              </p:txBody>
-            </p:sp>
-            <p:sp>
-              <p:nvSpPr>
-                <p:cNvPr id="2082" name="AutoShape 34"/>
-                <p:cNvSpPr>
-                  <a:spLocks noChangeArrowheads="1"/>
-                </p:cNvSpPr>
-                <p:nvPr/>
-              </p:nvSpPr>
-              <p:spPr bwMode="auto">
-                <a:xfrm>
-                  <a:off x="2471" y="2599"/>
-                  <a:ext cx="1875" cy="975"/>
-                </a:xfrm>
-                <a:prstGeom prst="roundRect">
-                  <a:avLst>
-                    <a:gd name="adj" fmla="val 16667"/>
-                  </a:avLst>
-                </a:prstGeom>
-                <a:gradFill rotWithShape="0">
-                  <a:gsLst>
-                    <a:gs pos="0">
-                      <a:srgbClr val="FFFFFF"/>
-                    </a:gs>
-                    <a:gs pos="100000">
-                      <a:srgbClr val="FBD4B4"/>
-                    </a:gs>
-                  </a:gsLst>
-                  <a:lin ang="5400000" scaled="1"/>
-                </a:gradFill>
-                <a:ln w="12700">
-                  <a:solidFill>
-                    <a:srgbClr val="FABF8F"/>
-                  </a:solidFill>
-                  <a:round/>
-                  <a:headEnd/>
-                  <a:tailEnd/>
-                </a:ln>
-                <a:effectLst>
-                  <a:outerShdw dist="107763" dir="18900000" algn="ctr" rotWithShape="0">
-                    <a:srgbClr val="974706">
-                      <a:alpha val="50000"/>
-                    </a:srgbClr>
-                  </a:outerShdw>
-                </a:effectLst>
-              </p:spPr>
-              <p:txBody>
-                <a:bodyPr vert="horz" wrap="square" lIns="91440" tIns="45720" rIns="91440" bIns="45720" numCol="1" anchor="t" anchorCtr="0" compatLnSpc="1">
-                  <a:prstTxWarp prst="textNoShape">
-                    <a:avLst/>
-                  </a:prstTxWarp>
-                </a:bodyPr>
-                <a:lstStyle/>
-                <a:p>
-                  <a:pPr marL="0" marR="0" lvl="0" indent="0" algn="ctr" defTabSz="914400" rtl="0" eaLnBrk="1" fontAlgn="base" latinLnBrk="0" hangingPunct="1">
-                    <a:lnSpc>
-                      <a:spcPct val="100000"/>
-                    </a:lnSpc>
-                    <a:spcBef>
-                      <a:spcPct val="0"/>
-                    </a:spcBef>
-                    <a:spcAft>
-                      <a:spcPct val="0"/>
-                    </a:spcAft>
-                    <a:buClrTx/>
-                    <a:buSzTx/>
-                    <a:buFontTx/>
-                    <a:buNone/>
-                    <a:tabLst/>
-                  </a:pPr>
-                  <a:r>
-                    <a:rPr kumimoji="0" lang="es-AR" sz="900" b="0" i="0" u="none" strike="noStrike" cap="none" normalizeH="0" baseline="0" smtClean="0">
-                      <a:ln>
-                        <a:noFill/>
-                      </a:ln>
-                      <a:solidFill>
-                        <a:schemeClr val="tx1"/>
-                      </a:solidFill>
-                      <a:effectLst/>
-                      <a:latin typeface="Arial" pitchFamily="34" charset="0"/>
-                      <a:ea typeface="Times New Roman" pitchFamily="18" charset="0"/>
-                      <a:cs typeface="Arial" pitchFamily="34" charset="0"/>
-                    </a:rPr>
-                    <a:t>&lt;UI Component&gt;</a:t>
-                  </a:r>
-                  <a:endParaRPr kumimoji="0" lang="es-AR" sz="800" b="0" i="0" u="none" strike="noStrike" cap="none" normalizeH="0" baseline="0" smtClean="0">
-                    <a:ln>
-                      <a:noFill/>
-                    </a:ln>
-                    <a:solidFill>
-                      <a:schemeClr val="tx1"/>
-                    </a:solidFill>
-                    <a:effectLst/>
-                    <a:latin typeface="Arial" pitchFamily="34" charset="0"/>
-                  </a:endParaRPr>
-                </a:p>
-                <a:p>
-                  <a:pPr marL="0" marR="0" lvl="0" indent="0" algn="ctr" defTabSz="914400" rtl="0" eaLnBrk="0" fontAlgn="base" latinLnBrk="0" hangingPunct="0">
-                    <a:lnSpc>
-                      <a:spcPct val="100000"/>
-                    </a:lnSpc>
-                    <a:spcBef>
-                      <a:spcPct val="0"/>
-                    </a:spcBef>
-                    <a:spcAft>
-                      <a:spcPct val="0"/>
-                    </a:spcAft>
-                    <a:buClrTx/>
-                    <a:buSzTx/>
-                    <a:buFontTx/>
-                    <a:buNone/>
-                    <a:tabLst/>
-                  </a:pPr>
-                  <a:r>
-                    <a:rPr kumimoji="0" lang="es-AR" sz="900" b="0" i="0" u="none" strike="noStrike" cap="none" normalizeH="0" baseline="0" smtClean="0">
-                      <a:ln>
-                        <a:noFill/>
-                      </a:ln>
-                      <a:solidFill>
-                        <a:schemeClr val="tx1"/>
-                      </a:solidFill>
-                      <a:effectLst/>
-                      <a:latin typeface="Arial" pitchFamily="34" charset="0"/>
-                      <a:ea typeface="Times New Roman" pitchFamily="18" charset="0"/>
-                      <a:cs typeface="Arial" pitchFamily="34" charset="0"/>
-                    </a:rPr>
-                    <a:t>HTML, CSS, JS</a:t>
-                  </a:r>
-                  <a:endParaRPr kumimoji="0" lang="es-AR" sz="1800" b="0" i="0" u="none" strike="noStrike" cap="none" normalizeH="0" baseline="0" smtClean="0">
-                    <a:ln>
-                      <a:noFill/>
-                    </a:ln>
-                    <a:solidFill>
-                      <a:schemeClr val="tx1"/>
-                    </a:solidFill>
-                    <a:effectLst/>
-                    <a:latin typeface="Arial" pitchFamily="34" charset="0"/>
-                  </a:endParaRPr>
-                </a:p>
-              </p:txBody>
-            </p:sp>
-            <p:sp>
-              <p:nvSpPr>
-                <p:cNvPr id="2081" name="AutoShape 33"/>
-                <p:cNvSpPr>
-                  <a:spLocks noChangeArrowheads="1"/>
-                </p:cNvSpPr>
-                <p:nvPr/>
-              </p:nvSpPr>
-              <p:spPr bwMode="auto">
-                <a:xfrm>
-                  <a:off x="4721" y="2584"/>
-                  <a:ext cx="1875" cy="975"/>
-                </a:xfrm>
-                <a:prstGeom prst="roundRect">
-                  <a:avLst>
-                    <a:gd name="adj" fmla="val 16667"/>
-                  </a:avLst>
-                </a:prstGeom>
-                <a:gradFill rotWithShape="0">
-                  <a:gsLst>
-                    <a:gs pos="0">
-                      <a:srgbClr val="FFFFFF"/>
-                    </a:gs>
-                    <a:gs pos="100000">
-                      <a:srgbClr val="FBD4B4"/>
-                    </a:gs>
-                  </a:gsLst>
-                  <a:lin ang="5400000" scaled="1"/>
-                </a:gradFill>
-                <a:ln w="12700">
-                  <a:solidFill>
-                    <a:srgbClr val="FABF8F"/>
-                  </a:solidFill>
-                  <a:round/>
-                  <a:headEnd/>
-                  <a:tailEnd/>
-                </a:ln>
-                <a:effectLst>
-                  <a:outerShdw dist="107763" dir="18900000" algn="ctr" rotWithShape="0">
-                    <a:srgbClr val="974706">
-                      <a:alpha val="50000"/>
-                    </a:srgbClr>
-                  </a:outerShdw>
-                </a:effectLst>
-              </p:spPr>
-              <p:txBody>
-                <a:bodyPr vert="horz" wrap="square" lIns="91440" tIns="45720" rIns="91440" bIns="45720" numCol="1" anchor="t" anchorCtr="0" compatLnSpc="1">
-                  <a:prstTxWarp prst="textNoShape">
-                    <a:avLst/>
-                  </a:prstTxWarp>
-                </a:bodyPr>
-                <a:lstStyle/>
-                <a:p>
-                  <a:pPr marL="0" marR="0" lvl="0" indent="0" algn="ctr" defTabSz="914400" rtl="0" eaLnBrk="1" fontAlgn="base" latinLnBrk="0" hangingPunct="1">
-                    <a:lnSpc>
-                      <a:spcPct val="100000"/>
-                    </a:lnSpc>
-                    <a:spcBef>
-                      <a:spcPct val="0"/>
-                    </a:spcBef>
-                    <a:spcAft>
-                      <a:spcPct val="0"/>
-                    </a:spcAft>
-                    <a:buClrTx/>
-                    <a:buSzTx/>
-                    <a:buFontTx/>
-                    <a:buNone/>
-                    <a:tabLst/>
-                  </a:pPr>
-                  <a:r>
-                    <a:rPr kumimoji="0" lang="es-AR" sz="900" b="0" i="0" u="none" strike="noStrike" cap="none" normalizeH="0" baseline="0" smtClean="0">
-                      <a:ln>
-                        <a:noFill/>
-                      </a:ln>
-                      <a:solidFill>
-                        <a:schemeClr val="tx1"/>
-                      </a:solidFill>
-                      <a:effectLst/>
-                      <a:latin typeface="Arial" pitchFamily="34" charset="0"/>
-                      <a:ea typeface="Times New Roman" pitchFamily="18" charset="0"/>
-                      <a:cs typeface="Arial" pitchFamily="34" charset="0"/>
-                    </a:rPr>
-                    <a:t>&lt;RIA&gt;</a:t>
-                  </a:r>
-                  <a:endParaRPr kumimoji="0" lang="es-AR" sz="800" b="0" i="0" u="none" strike="noStrike" cap="none" normalizeH="0" baseline="0" smtClean="0">
-                    <a:ln>
-                      <a:noFill/>
-                    </a:ln>
-                    <a:solidFill>
-                      <a:schemeClr val="tx1"/>
-                    </a:solidFill>
-                    <a:effectLst/>
-                    <a:latin typeface="Arial" pitchFamily="34" charset="0"/>
-                  </a:endParaRPr>
-                </a:p>
-                <a:p>
-                  <a:pPr marL="0" marR="0" lvl="0" indent="0" algn="ctr" defTabSz="914400" rtl="0" eaLnBrk="0" fontAlgn="base" latinLnBrk="0" hangingPunct="0">
-                    <a:lnSpc>
-                      <a:spcPct val="100000"/>
-                    </a:lnSpc>
-                    <a:spcBef>
-                      <a:spcPct val="0"/>
-                    </a:spcBef>
-                    <a:spcAft>
-                      <a:spcPct val="0"/>
-                    </a:spcAft>
-                    <a:buClrTx/>
-                    <a:buSzTx/>
-                    <a:buFontTx/>
-                    <a:buNone/>
-                    <a:tabLst/>
-                  </a:pPr>
-                  <a:r>
-                    <a:rPr kumimoji="0" lang="es-AR" sz="900" b="0" i="0" u="none" strike="noStrike" cap="none" normalizeH="0" baseline="0" smtClean="0">
-                      <a:ln>
-                        <a:noFill/>
-                      </a:ln>
-                      <a:solidFill>
-                        <a:schemeClr val="tx1"/>
-                      </a:solidFill>
-                      <a:effectLst/>
-                      <a:latin typeface="Arial" pitchFamily="34" charset="0"/>
-                      <a:ea typeface="Times New Roman" pitchFamily="18" charset="0"/>
-                      <a:cs typeface="Arial" pitchFamily="34" charset="0"/>
-                    </a:rPr>
-                    <a:t>GWT</a:t>
-                  </a:r>
-                  <a:endParaRPr kumimoji="0" lang="es-AR" sz="1800" b="0" i="0" u="none" strike="noStrike" cap="none" normalizeH="0" baseline="0" smtClean="0">
-                    <a:ln>
-                      <a:noFill/>
-                    </a:ln>
-                    <a:solidFill>
-                      <a:schemeClr val="tx1"/>
-                    </a:solidFill>
-                    <a:effectLst/>
-                    <a:latin typeface="Arial" pitchFamily="34" charset="0"/>
-                  </a:endParaRPr>
-                </a:p>
-              </p:txBody>
-            </p:sp>
-          </p:grpSp>
-          <p:grpSp>
-            <p:nvGrpSpPr>
-              <p:cNvPr id="2065" name="Group 17"/>
-              <p:cNvGrpSpPr>
-                <a:grpSpLocks/>
-              </p:cNvGrpSpPr>
-              <p:nvPr/>
-            </p:nvGrpSpPr>
-            <p:grpSpPr bwMode="auto">
-              <a:xfrm>
-                <a:off x="1757" y="4110"/>
-                <a:ext cx="8660" cy="6826"/>
-                <a:chOff x="1757" y="4110"/>
-                <a:chExt cx="8660" cy="6826"/>
-              </a:xfrm>
-            </p:grpSpPr>
-            <p:sp>
-              <p:nvSpPr>
-                <p:cNvPr id="2079" name="Rectangle 31"/>
-                <p:cNvSpPr>
-                  <a:spLocks noChangeArrowheads="1"/>
-                </p:cNvSpPr>
-                <p:nvPr/>
-              </p:nvSpPr>
-              <p:spPr bwMode="auto">
-                <a:xfrm>
-                  <a:off x="1757" y="4110"/>
-                  <a:ext cx="8660" cy="6826"/>
-                </a:xfrm>
-                <a:prstGeom prst="rect">
-                  <a:avLst/>
-                </a:prstGeom>
-                <a:gradFill rotWithShape="0">
-                  <a:gsLst>
-                    <a:gs pos="0">
-                      <a:srgbClr val="95B3D7"/>
-                    </a:gs>
-                    <a:gs pos="50000">
-                      <a:srgbClr val="DBE5F1"/>
-                    </a:gs>
-                    <a:gs pos="100000">
-                      <a:srgbClr val="95B3D7"/>
-                    </a:gs>
-                  </a:gsLst>
-                  <a:lin ang="18900000" scaled="1"/>
-                </a:gradFill>
-                <a:ln w="12700">
-                  <a:solidFill>
-                    <a:srgbClr val="95B3D7"/>
-                  </a:solidFill>
-                  <a:miter lim="800000"/>
-                  <a:headEnd/>
-                  <a:tailEnd/>
-                </a:ln>
-                <a:effectLst>
-                  <a:outerShdw dist="107763" dir="18900000" algn="ctr" rotWithShape="0">
-                    <a:srgbClr val="243F60">
-                      <a:alpha val="50000"/>
-                    </a:srgbClr>
-                  </a:outerShdw>
-                </a:effectLst>
-              </p:spPr>
-              <p:txBody>
-                <a:bodyPr vert="horz" wrap="square" lIns="91440" tIns="45720" rIns="91440" bIns="45720" numCol="1" anchor="t" anchorCtr="0" compatLnSpc="1">
-                  <a:prstTxWarp prst="textNoShape">
-                    <a:avLst/>
-                  </a:prstTxWarp>
-                </a:bodyPr>
-                <a:lstStyle/>
-                <a:p>
-                  <a:pPr marL="0" marR="0" lvl="0" indent="0" algn="l" defTabSz="914400" rtl="0" eaLnBrk="1" fontAlgn="base" latinLnBrk="0" hangingPunct="1">
-                    <a:lnSpc>
-                      <a:spcPct val="100000"/>
-                    </a:lnSpc>
-                    <a:spcBef>
-                      <a:spcPct val="0"/>
-                    </a:spcBef>
-                    <a:spcAft>
-                      <a:spcPct val="0"/>
-                    </a:spcAft>
-                    <a:buClrTx/>
-                    <a:buSzTx/>
-                    <a:buFontTx/>
-                    <a:buNone/>
-                    <a:tabLst/>
-                  </a:pPr>
-                  <a:r>
-                    <a:rPr kumimoji="0" lang="es-AR" sz="1000" b="0" i="0" u="none" strike="noStrike" cap="none" normalizeH="0" baseline="0" smtClean="0">
-                      <a:ln>
-                        <a:noFill/>
-                      </a:ln>
-                      <a:solidFill>
-                        <a:schemeClr val="tx1"/>
-                      </a:solidFill>
-                      <a:effectLst/>
-                      <a:latin typeface="Arial" pitchFamily="34" charset="0"/>
-                      <a:ea typeface="Times New Roman" pitchFamily="18" charset="0"/>
-                      <a:cs typeface="Arial" pitchFamily="34" charset="0"/>
-                    </a:rPr>
-                    <a:t>&lt;Web Server&gt;</a:t>
-                  </a:r>
-                  <a:endParaRPr kumimoji="0" lang="es-AR" sz="800" b="0" i="0" u="none" strike="noStrike" cap="none" normalizeH="0" baseline="0" smtClean="0">
-                    <a:ln>
-                      <a:noFill/>
-                    </a:ln>
-                    <a:solidFill>
-                      <a:schemeClr val="tx1"/>
-                    </a:solidFill>
-                    <a:effectLst/>
-                    <a:latin typeface="Arial" pitchFamily="34" charset="0"/>
-                  </a:endParaRPr>
-                </a:p>
-                <a:p>
-                  <a:pPr marL="0" marR="0" lvl="0" indent="0" algn="l" defTabSz="914400" rtl="0" eaLnBrk="0" fontAlgn="base" latinLnBrk="0" hangingPunct="0">
-                    <a:lnSpc>
-                      <a:spcPct val="100000"/>
-                    </a:lnSpc>
-                    <a:spcBef>
-                      <a:spcPct val="0"/>
-                    </a:spcBef>
-                    <a:spcAft>
-                      <a:spcPct val="0"/>
-                    </a:spcAft>
-                    <a:buClrTx/>
-                    <a:buSzTx/>
-                    <a:buFontTx/>
-                    <a:buNone/>
-                    <a:tabLst/>
-                  </a:pPr>
-                  <a:r>
-                    <a:rPr kumimoji="0" lang="es-AR" sz="1000" b="0" i="0" u="none" strike="noStrike" cap="none" normalizeH="0" baseline="0" smtClean="0">
-                      <a:ln>
-                        <a:noFill/>
-                      </a:ln>
-                      <a:solidFill>
-                        <a:schemeClr val="tx1"/>
-                      </a:solidFill>
-                      <a:effectLst/>
-                      <a:latin typeface="Arial" pitchFamily="34" charset="0"/>
-                      <a:ea typeface="Times New Roman" pitchFamily="18" charset="0"/>
-                      <a:cs typeface="Arial" pitchFamily="34" charset="0"/>
-                    </a:rPr>
-                    <a:t>Apache Tomcat 6.0</a:t>
-                  </a:r>
-                  <a:endParaRPr kumimoji="0" lang="es-AR" sz="1800" b="0" i="0" u="none" strike="noStrike" cap="none" normalizeH="0" baseline="0" smtClean="0">
-                    <a:ln>
-                      <a:noFill/>
-                    </a:ln>
-                    <a:solidFill>
-                      <a:schemeClr val="tx1"/>
-                    </a:solidFill>
-                    <a:effectLst/>
-                    <a:latin typeface="Arial" pitchFamily="34" charset="0"/>
-                  </a:endParaRPr>
-                </a:p>
-              </p:txBody>
-            </p:sp>
-            <p:grpSp>
-              <p:nvGrpSpPr>
-                <p:cNvPr id="2074" name="Group 26"/>
-                <p:cNvGrpSpPr>
-                  <a:grpSpLocks/>
-                </p:cNvGrpSpPr>
-                <p:nvPr/>
-              </p:nvGrpSpPr>
-              <p:grpSpPr bwMode="auto">
-                <a:xfrm>
-                  <a:off x="1901" y="4956"/>
-                  <a:ext cx="5187" cy="3268"/>
-                  <a:chOff x="1901" y="4956"/>
-                  <a:chExt cx="5187" cy="3268"/>
-                </a:xfrm>
-              </p:grpSpPr>
-              <p:sp>
-                <p:nvSpPr>
-                  <p:cNvPr id="2078" name="AutoShape 30"/>
-                  <p:cNvSpPr>
-                    <a:spLocks noChangeArrowheads="1"/>
-                  </p:cNvSpPr>
-                  <p:nvPr/>
-                </p:nvSpPr>
-                <p:spPr bwMode="auto">
-                  <a:xfrm>
-                    <a:off x="1901" y="4956"/>
-                    <a:ext cx="5187" cy="3268"/>
-                  </a:xfrm>
-                  <a:prstGeom prst="roundRect">
-                    <a:avLst>
-                      <a:gd name="adj" fmla="val 16667"/>
-                    </a:avLst>
-                  </a:prstGeom>
-                  <a:gradFill rotWithShape="0">
-                    <a:gsLst>
-                      <a:gs pos="0">
-                        <a:srgbClr val="C2D69B"/>
-                      </a:gs>
-                      <a:gs pos="50000">
-                        <a:srgbClr val="EAF1DD"/>
-                      </a:gs>
-                      <a:gs pos="100000">
-                        <a:srgbClr val="C2D69B"/>
-                      </a:gs>
-                    </a:gsLst>
-                    <a:lin ang="18900000" scaled="1"/>
-                  </a:gradFill>
-                  <a:ln w="12700">
-                    <a:solidFill>
-                      <a:srgbClr val="C2D69B"/>
-                    </a:solidFill>
-                    <a:round/>
-                    <a:headEnd/>
-                    <a:tailEnd/>
-                  </a:ln>
-                  <a:effectLst>
-                    <a:outerShdw dist="107763" dir="18900000" algn="ctr" rotWithShape="0">
-                      <a:srgbClr val="4E6128">
-                        <a:alpha val="50000"/>
-                      </a:srgbClr>
-                    </a:outerShdw>
-                  </a:effectLst>
-                </p:spPr>
-                <p:txBody>
-                  <a:bodyPr vert="horz" wrap="square" lIns="91440" tIns="45720" rIns="91440" bIns="45720" numCol="1" anchor="t" anchorCtr="0" compatLnSpc="1">
-                    <a:prstTxWarp prst="textNoShape">
-                      <a:avLst/>
-                    </a:prstTxWarp>
-                  </a:bodyPr>
-                  <a:lstStyle/>
-                  <a:p>
-                    <a:pPr marL="0" marR="0" lvl="0" indent="0" algn="l" defTabSz="914400" rtl="0" eaLnBrk="1" fontAlgn="base" latinLnBrk="0" hangingPunct="1">
-                      <a:lnSpc>
-                        <a:spcPct val="100000"/>
-                      </a:lnSpc>
-                      <a:spcBef>
-                        <a:spcPct val="0"/>
-                      </a:spcBef>
-                      <a:spcAft>
-                        <a:spcPct val="0"/>
-                      </a:spcAft>
-                      <a:buClrTx/>
-                      <a:buSzTx/>
-                      <a:buFontTx/>
-                      <a:buNone/>
-                      <a:tabLst/>
-                    </a:pPr>
-                    <a:r>
-                      <a:rPr kumimoji="0" lang="es-AR" sz="1000" b="0" i="0" u="none" strike="noStrike" cap="none" normalizeH="0" baseline="0" smtClean="0">
-                        <a:ln>
-                          <a:noFill/>
-                        </a:ln>
-                        <a:solidFill>
-                          <a:schemeClr val="tx1"/>
-                        </a:solidFill>
-                        <a:effectLst/>
-                        <a:latin typeface="Arial" pitchFamily="34" charset="0"/>
-                        <a:ea typeface="Times New Roman" pitchFamily="18" charset="0"/>
-                        <a:cs typeface="Arial" pitchFamily="34" charset="0"/>
-                      </a:rPr>
-                      <a:t>&lt; Model&gt;</a:t>
-                    </a:r>
-                    <a:endParaRPr kumimoji="0" lang="es-AR" sz="800" b="0" i="0" u="none" strike="noStrike" cap="none" normalizeH="0" baseline="0" smtClean="0">
-                      <a:ln>
-                        <a:noFill/>
-                      </a:ln>
-                      <a:solidFill>
-                        <a:schemeClr val="tx1"/>
-                      </a:solidFill>
-                      <a:effectLst/>
-                      <a:latin typeface="Arial" pitchFamily="34" charset="0"/>
-                    </a:endParaRPr>
-                  </a:p>
-                  <a:p>
-                    <a:pPr marL="0" marR="0" lvl="0" indent="0" algn="l" defTabSz="914400" rtl="0" eaLnBrk="0" fontAlgn="base" latinLnBrk="0" hangingPunct="0">
-                      <a:lnSpc>
-                        <a:spcPct val="100000"/>
-                      </a:lnSpc>
-                      <a:spcBef>
-                        <a:spcPct val="0"/>
-                      </a:spcBef>
-                      <a:spcAft>
-                        <a:spcPct val="0"/>
-                      </a:spcAft>
-                      <a:buClrTx/>
-                      <a:buSzTx/>
-                      <a:buFontTx/>
-                      <a:buNone/>
-                      <a:tabLst/>
-                    </a:pPr>
-                    <a:r>
-                      <a:rPr kumimoji="0" lang="es-AR" sz="1000" b="0" i="0" u="none" strike="noStrike" cap="none" normalizeH="0" baseline="0" smtClean="0">
-                        <a:ln>
-                          <a:noFill/>
-                        </a:ln>
-                        <a:solidFill>
-                          <a:schemeClr val="tx1"/>
-                        </a:solidFill>
-                        <a:effectLst/>
-                        <a:latin typeface="Arial" pitchFamily="34" charset="0"/>
-                        <a:ea typeface="Times New Roman" pitchFamily="18" charset="0"/>
-                        <a:cs typeface="Arial" pitchFamily="34" charset="0"/>
-                      </a:rPr>
-                      <a:t>Framework Play</a:t>
-                    </a:r>
-                    <a:endParaRPr kumimoji="0" lang="es-AR" sz="800" b="0" i="0" u="none" strike="noStrike" cap="none" normalizeH="0" baseline="0" smtClean="0">
-                      <a:ln>
-                        <a:noFill/>
-                      </a:ln>
-                      <a:solidFill>
-                        <a:schemeClr val="tx1"/>
-                      </a:solidFill>
-                      <a:effectLst/>
-                      <a:latin typeface="Arial" pitchFamily="34" charset="0"/>
-                    </a:endParaRPr>
-                  </a:p>
-                  <a:p>
-                    <a:pPr marL="0" marR="0" lvl="0" indent="0" algn="l" defTabSz="914400" rtl="0" eaLnBrk="0" fontAlgn="base" latinLnBrk="0" hangingPunct="0">
-                      <a:lnSpc>
-                        <a:spcPct val="100000"/>
-                      </a:lnSpc>
-                      <a:spcBef>
-                        <a:spcPct val="0"/>
-                      </a:spcBef>
-                      <a:spcAft>
-                        <a:spcPct val="0"/>
-                      </a:spcAft>
-                      <a:buClrTx/>
-                      <a:buSzTx/>
-                      <a:buFontTx/>
-                      <a:buNone/>
-                      <a:tabLst/>
-                    </a:pPr>
-                    <a:endParaRPr kumimoji="0" lang="es-AR" sz="1800" b="0" i="0" u="none" strike="noStrike" cap="none" normalizeH="0" baseline="0" smtClean="0">
-                      <a:ln>
-                        <a:noFill/>
-                      </a:ln>
-                      <a:solidFill>
-                        <a:schemeClr val="tx1"/>
-                      </a:solidFill>
-                      <a:effectLst/>
-                      <a:latin typeface="Arial" pitchFamily="34" charset="0"/>
-                    </a:endParaRPr>
-                  </a:p>
-                </p:txBody>
-              </p:sp>
-              <p:sp>
-                <p:nvSpPr>
-                  <p:cNvPr id="2077" name="AutoShape 29"/>
-                  <p:cNvSpPr>
-                    <a:spLocks noChangeArrowheads="1"/>
-                  </p:cNvSpPr>
-                  <p:nvPr/>
-                </p:nvSpPr>
-                <p:spPr bwMode="auto">
-                  <a:xfrm>
-                    <a:off x="4770" y="5840"/>
-                    <a:ext cx="1875" cy="975"/>
-                  </a:xfrm>
-                  <a:prstGeom prst="roundRect">
-                    <a:avLst>
-                      <a:gd name="adj" fmla="val 16667"/>
-                    </a:avLst>
-                  </a:prstGeom>
-                  <a:gradFill rotWithShape="0">
-                    <a:gsLst>
-                      <a:gs pos="0">
-                        <a:srgbClr val="FFFFFF"/>
-                      </a:gs>
-                      <a:gs pos="100000">
-                        <a:srgbClr val="D6E3BC"/>
-                      </a:gs>
-                    </a:gsLst>
-                    <a:lin ang="5400000" scaled="1"/>
-                  </a:gradFill>
-                  <a:ln w="12700">
-                    <a:solidFill>
-                      <a:srgbClr val="C2D69B"/>
-                    </a:solidFill>
-                    <a:round/>
-                    <a:headEnd/>
-                    <a:tailEnd/>
-                  </a:ln>
-                  <a:effectLst>
-                    <a:outerShdw dist="107763" dir="18900000" algn="ctr" rotWithShape="0">
-                      <a:srgbClr val="4E6128">
-                        <a:alpha val="50000"/>
-                      </a:srgbClr>
-                    </a:outerShdw>
-                  </a:effectLst>
-                </p:spPr>
-                <p:txBody>
-                  <a:bodyPr vert="horz" wrap="square" lIns="91440" tIns="45720" rIns="91440" bIns="45720" numCol="1" anchor="t" anchorCtr="0" compatLnSpc="1">
-                    <a:prstTxWarp prst="textNoShape">
-                      <a:avLst/>
-                    </a:prstTxWarp>
-                  </a:bodyPr>
-                  <a:lstStyle/>
-                  <a:p>
-                    <a:pPr marL="0" marR="0" lvl="0" indent="0" algn="ctr" defTabSz="914400" rtl="0" eaLnBrk="1" fontAlgn="base" latinLnBrk="0" hangingPunct="1">
-                      <a:lnSpc>
-                        <a:spcPct val="100000"/>
-                      </a:lnSpc>
-                      <a:spcBef>
-                        <a:spcPct val="0"/>
-                      </a:spcBef>
-                      <a:spcAft>
-                        <a:spcPct val="0"/>
-                      </a:spcAft>
-                      <a:buClrTx/>
-                      <a:buSzTx/>
-                      <a:buFontTx/>
-                      <a:buNone/>
-                      <a:tabLst/>
-                    </a:pPr>
-                    <a:r>
-                      <a:rPr kumimoji="0" lang="es-AR" sz="900" b="0" i="0" u="none" strike="noStrike" cap="none" normalizeH="0" baseline="0" smtClean="0">
-                        <a:ln>
-                          <a:noFill/>
-                        </a:ln>
-                        <a:solidFill>
-                          <a:schemeClr val="tx1"/>
-                        </a:solidFill>
-                        <a:effectLst/>
-                        <a:latin typeface="Arial" pitchFamily="34" charset="0"/>
-                        <a:ea typeface="Times New Roman" pitchFamily="18" charset="0"/>
-                        <a:cs typeface="Arial" pitchFamily="34" charset="0"/>
-                      </a:rPr>
-                      <a:t>&lt;Controler&gt;</a:t>
-                    </a:r>
-                    <a:endParaRPr kumimoji="0" lang="es-AR" sz="800" b="0" i="0" u="none" strike="noStrike" cap="none" normalizeH="0" baseline="0" smtClean="0">
-                      <a:ln>
-                        <a:noFill/>
-                      </a:ln>
-                      <a:solidFill>
-                        <a:schemeClr val="tx1"/>
-                      </a:solidFill>
-                      <a:effectLst/>
-                      <a:latin typeface="Arial" pitchFamily="34" charset="0"/>
-                    </a:endParaRPr>
-                  </a:p>
-                  <a:p>
-                    <a:pPr marL="0" marR="0" lvl="0" indent="0" algn="ctr" defTabSz="914400" rtl="0" eaLnBrk="0" fontAlgn="base" latinLnBrk="0" hangingPunct="0">
-                      <a:lnSpc>
-                        <a:spcPct val="100000"/>
-                      </a:lnSpc>
-                      <a:spcBef>
-                        <a:spcPct val="0"/>
-                      </a:spcBef>
-                      <a:spcAft>
-                        <a:spcPct val="0"/>
-                      </a:spcAft>
-                      <a:buClrTx/>
-                      <a:buSzTx/>
-                      <a:buFontTx/>
-                      <a:buNone/>
-                      <a:tabLst/>
-                    </a:pPr>
-                    <a:r>
-                      <a:rPr kumimoji="0" lang="es-AR" sz="900" b="0" i="0" u="none" strike="noStrike" cap="none" normalizeH="0" baseline="0" smtClean="0">
-                        <a:ln>
-                          <a:noFill/>
-                        </a:ln>
-                        <a:solidFill>
-                          <a:schemeClr val="tx1"/>
-                        </a:solidFill>
-                        <a:effectLst/>
-                        <a:latin typeface="Arial" pitchFamily="34" charset="0"/>
-                        <a:ea typeface="Times New Roman" pitchFamily="18" charset="0"/>
-                        <a:cs typeface="Arial" pitchFamily="34" charset="0"/>
-                      </a:rPr>
-                      <a:t>Service</a:t>
-                    </a:r>
-                    <a:endParaRPr kumimoji="0" lang="es-AR" sz="1800" b="0" i="0" u="none" strike="noStrike" cap="none" normalizeH="0" baseline="0" smtClean="0">
-                      <a:ln>
-                        <a:noFill/>
-                      </a:ln>
-                      <a:solidFill>
-                        <a:schemeClr val="tx1"/>
-                      </a:solidFill>
-                      <a:effectLst/>
-                      <a:latin typeface="Arial" pitchFamily="34" charset="0"/>
-                    </a:endParaRPr>
-                  </a:p>
-                </p:txBody>
-              </p:sp>
-              <p:sp>
-                <p:nvSpPr>
-                  <p:cNvPr id="2076" name="AutoShape 28"/>
-                  <p:cNvSpPr>
-                    <a:spLocks noChangeArrowheads="1"/>
-                  </p:cNvSpPr>
-                  <p:nvPr/>
-                </p:nvSpPr>
-                <p:spPr bwMode="auto">
-                  <a:xfrm>
-                    <a:off x="2243" y="5897"/>
-                    <a:ext cx="1875" cy="975"/>
-                  </a:xfrm>
-                  <a:prstGeom prst="roundRect">
-                    <a:avLst>
-                      <a:gd name="adj" fmla="val 16667"/>
-                    </a:avLst>
-                  </a:prstGeom>
-                  <a:gradFill rotWithShape="0">
-                    <a:gsLst>
-                      <a:gs pos="0">
-                        <a:srgbClr val="FFFFFF"/>
-                      </a:gs>
-                      <a:gs pos="100000">
-                        <a:srgbClr val="D6E3BC"/>
-                      </a:gs>
-                    </a:gsLst>
-                    <a:lin ang="5400000" scaled="1"/>
-                  </a:gradFill>
-                  <a:ln w="12700">
-                    <a:solidFill>
-                      <a:srgbClr val="C2D69B"/>
-                    </a:solidFill>
-                    <a:round/>
-                    <a:headEnd/>
-                    <a:tailEnd/>
-                  </a:ln>
-                  <a:effectLst>
-                    <a:outerShdw dist="107763" dir="18900000" algn="ctr" rotWithShape="0">
-                      <a:srgbClr val="4E6128">
-                        <a:alpha val="50000"/>
-                      </a:srgbClr>
-                    </a:outerShdw>
-                  </a:effectLst>
-                </p:spPr>
-                <p:txBody>
-                  <a:bodyPr vert="horz" wrap="square" lIns="91440" tIns="45720" rIns="91440" bIns="45720" numCol="1" anchor="t" anchorCtr="0" compatLnSpc="1">
-                    <a:prstTxWarp prst="textNoShape">
-                      <a:avLst/>
-                    </a:prstTxWarp>
-                  </a:bodyPr>
-                  <a:lstStyle/>
-                  <a:p>
-                    <a:pPr marL="0" marR="0" lvl="0" indent="0" algn="ctr" defTabSz="914400" rtl="0" eaLnBrk="1" fontAlgn="base" latinLnBrk="0" hangingPunct="1">
-                      <a:lnSpc>
-                        <a:spcPct val="100000"/>
-                      </a:lnSpc>
-                      <a:spcBef>
-                        <a:spcPct val="0"/>
-                      </a:spcBef>
-                      <a:spcAft>
-                        <a:spcPct val="0"/>
-                      </a:spcAft>
-                      <a:buClrTx/>
-                      <a:buSzTx/>
-                      <a:buFontTx/>
-                      <a:buNone/>
-                      <a:tabLst/>
-                    </a:pPr>
-                    <a:r>
-                      <a:rPr kumimoji="0" lang="es-AR" sz="900" b="0" i="0" u="none" strike="noStrike" cap="none" normalizeH="0" baseline="0" smtClean="0">
-                        <a:ln>
-                          <a:noFill/>
-                        </a:ln>
-                        <a:solidFill>
-                          <a:schemeClr val="tx1"/>
-                        </a:solidFill>
-                        <a:effectLst/>
-                        <a:latin typeface="Arial" pitchFamily="34" charset="0"/>
-                        <a:ea typeface="Times New Roman" pitchFamily="18" charset="0"/>
-                        <a:cs typeface="Arial" pitchFamily="34" charset="0"/>
-                      </a:rPr>
-                      <a:t>&lt;Logger&gt;</a:t>
-                    </a:r>
-                    <a:endParaRPr kumimoji="0" lang="es-AR" sz="800" b="0" i="0" u="none" strike="noStrike" cap="none" normalizeH="0" baseline="0" smtClean="0">
-                      <a:ln>
-                        <a:noFill/>
-                      </a:ln>
-                      <a:solidFill>
-                        <a:schemeClr val="tx1"/>
-                      </a:solidFill>
-                      <a:effectLst/>
-                      <a:latin typeface="Arial" pitchFamily="34" charset="0"/>
-                    </a:endParaRPr>
-                  </a:p>
-                  <a:p>
-                    <a:pPr marL="0" marR="0" lvl="0" indent="0" algn="ctr" defTabSz="914400" rtl="0" eaLnBrk="0" fontAlgn="base" latinLnBrk="0" hangingPunct="0">
-                      <a:lnSpc>
-                        <a:spcPct val="100000"/>
-                      </a:lnSpc>
-                      <a:spcBef>
-                        <a:spcPct val="0"/>
-                      </a:spcBef>
-                      <a:spcAft>
-                        <a:spcPct val="0"/>
-                      </a:spcAft>
-                      <a:buClrTx/>
-                      <a:buSzTx/>
-                      <a:buFontTx/>
-                      <a:buNone/>
-                      <a:tabLst/>
-                    </a:pPr>
-                    <a:r>
-                      <a:rPr kumimoji="0" lang="es-AR" sz="900" b="0" i="0" u="none" strike="noStrike" cap="none" normalizeH="0" baseline="0" smtClean="0">
-                        <a:ln>
-                          <a:noFill/>
-                        </a:ln>
-                        <a:solidFill>
-                          <a:schemeClr val="tx1"/>
-                        </a:solidFill>
-                        <a:effectLst/>
-                        <a:latin typeface="Arial" pitchFamily="34" charset="0"/>
-                        <a:ea typeface="Times New Roman" pitchFamily="18" charset="0"/>
-                        <a:cs typeface="Arial" pitchFamily="34" charset="0"/>
-                      </a:rPr>
-                      <a:t>Log4j</a:t>
-                    </a:r>
-                    <a:endParaRPr kumimoji="0" lang="es-AR" sz="1800" b="0" i="0" u="none" strike="noStrike" cap="none" normalizeH="0" baseline="0" smtClean="0">
-                      <a:ln>
-                        <a:noFill/>
-                      </a:ln>
-                      <a:solidFill>
-                        <a:schemeClr val="tx1"/>
-                      </a:solidFill>
-                      <a:effectLst/>
-                      <a:latin typeface="Arial" pitchFamily="34" charset="0"/>
-                    </a:endParaRPr>
-                  </a:p>
-                </p:txBody>
-              </p:sp>
-              <p:sp>
-                <p:nvSpPr>
-                  <p:cNvPr id="2075" name="AutoShape 27"/>
-                  <p:cNvSpPr>
-                    <a:spLocks noChangeArrowheads="1"/>
-                  </p:cNvSpPr>
-                  <p:nvPr/>
-                </p:nvSpPr>
-                <p:spPr bwMode="auto">
-                  <a:xfrm>
-                    <a:off x="2259" y="7109"/>
-                    <a:ext cx="1875" cy="975"/>
-                  </a:xfrm>
-                  <a:prstGeom prst="roundRect">
-                    <a:avLst>
-                      <a:gd name="adj" fmla="val 16667"/>
-                    </a:avLst>
-                  </a:prstGeom>
-                  <a:gradFill rotWithShape="0">
-                    <a:gsLst>
-                      <a:gs pos="0">
-                        <a:srgbClr val="FFFFFF"/>
-                      </a:gs>
-                      <a:gs pos="100000">
-                        <a:srgbClr val="D6E3BC"/>
-                      </a:gs>
-                    </a:gsLst>
-                    <a:lin ang="5400000" scaled="1"/>
-                  </a:gradFill>
-                  <a:ln w="12700">
-                    <a:solidFill>
-                      <a:srgbClr val="C2D69B"/>
-                    </a:solidFill>
-                    <a:round/>
-                    <a:headEnd/>
-                    <a:tailEnd/>
-                  </a:ln>
-                  <a:effectLst>
-                    <a:outerShdw dist="107763" dir="18900000" algn="ctr" rotWithShape="0">
-                      <a:srgbClr val="4E6128">
-                        <a:alpha val="50000"/>
-                      </a:srgbClr>
-                    </a:outerShdw>
-                  </a:effectLst>
-                </p:spPr>
-                <p:txBody>
-                  <a:bodyPr vert="horz" wrap="square" lIns="91440" tIns="45720" rIns="91440" bIns="45720" numCol="1" anchor="t" anchorCtr="0" compatLnSpc="1">
-                    <a:prstTxWarp prst="textNoShape">
-                      <a:avLst/>
-                    </a:prstTxWarp>
-                  </a:bodyPr>
-                  <a:lstStyle/>
-                  <a:p>
-                    <a:pPr marL="0" marR="0" lvl="0" indent="0" algn="ctr" defTabSz="914400" rtl="0" eaLnBrk="1" fontAlgn="base" latinLnBrk="0" hangingPunct="1">
-                      <a:lnSpc>
-                        <a:spcPct val="100000"/>
-                      </a:lnSpc>
-                      <a:spcBef>
-                        <a:spcPct val="0"/>
-                      </a:spcBef>
-                      <a:spcAft>
-                        <a:spcPct val="0"/>
-                      </a:spcAft>
-                      <a:buClrTx/>
-                      <a:buSzTx/>
-                      <a:buFontTx/>
-                      <a:buNone/>
-                      <a:tabLst/>
-                    </a:pPr>
-                    <a:r>
-                      <a:rPr kumimoji="0" lang="es-AR" sz="900" b="0" i="0" u="none" strike="noStrike" cap="none" normalizeH="0" baseline="0" smtClean="0">
-                        <a:ln>
-                          <a:noFill/>
-                        </a:ln>
-                        <a:solidFill>
-                          <a:schemeClr val="tx1"/>
-                        </a:solidFill>
-                        <a:effectLst/>
-                        <a:latin typeface="Arial" pitchFamily="34" charset="0"/>
-                        <a:ea typeface="Times New Roman" pitchFamily="18" charset="0"/>
-                        <a:cs typeface="Arial" pitchFamily="34" charset="0"/>
-                      </a:rPr>
-                      <a:t>Mail</a:t>
-                    </a:r>
-                    <a:endParaRPr kumimoji="0" lang="es-AR" sz="1800" b="0" i="0" u="none" strike="noStrike" cap="none" normalizeH="0" baseline="0" smtClean="0">
-                      <a:ln>
-                        <a:noFill/>
-                      </a:ln>
-                      <a:solidFill>
-                        <a:schemeClr val="tx1"/>
-                      </a:solidFill>
-                      <a:effectLst/>
-                      <a:latin typeface="Arial" pitchFamily="34" charset="0"/>
-                    </a:endParaRPr>
-                  </a:p>
-                </p:txBody>
-              </p:sp>
-            </p:grpSp>
-            <p:grpSp>
-              <p:nvGrpSpPr>
-                <p:cNvPr id="2070" name="Group 22"/>
-                <p:cNvGrpSpPr>
-                  <a:grpSpLocks/>
-                </p:cNvGrpSpPr>
-                <p:nvPr/>
-              </p:nvGrpSpPr>
-              <p:grpSpPr bwMode="auto">
-                <a:xfrm>
-                  <a:off x="7650" y="4939"/>
-                  <a:ext cx="2379" cy="5712"/>
-                  <a:chOff x="7650" y="4939"/>
-                  <a:chExt cx="2379" cy="5712"/>
-                </a:xfrm>
-              </p:grpSpPr>
-              <p:sp>
-                <p:nvSpPr>
-                  <p:cNvPr id="2073" name="AutoShape 25"/>
-                  <p:cNvSpPr>
-                    <a:spLocks noChangeArrowheads="1"/>
-                  </p:cNvSpPr>
-                  <p:nvPr/>
-                </p:nvSpPr>
-                <p:spPr bwMode="auto">
-                  <a:xfrm>
-                    <a:off x="7650" y="4939"/>
-                    <a:ext cx="2379" cy="5712"/>
-                  </a:xfrm>
-                  <a:prstGeom prst="roundRect">
-                    <a:avLst>
-                      <a:gd name="adj" fmla="val 16667"/>
-                    </a:avLst>
-                  </a:prstGeom>
-                  <a:gradFill rotWithShape="0">
-                    <a:gsLst>
-                      <a:gs pos="0">
-                        <a:srgbClr val="92CDDC"/>
-                      </a:gs>
-                      <a:gs pos="50000">
-                        <a:srgbClr val="DAEEF3"/>
-                      </a:gs>
-                      <a:gs pos="100000">
-                        <a:srgbClr val="92CDDC"/>
-                      </a:gs>
-                    </a:gsLst>
-                    <a:lin ang="18900000" scaled="1"/>
-                  </a:gradFill>
-                  <a:ln w="12700">
-                    <a:solidFill>
-                      <a:srgbClr val="92CDDC"/>
-                    </a:solidFill>
-                    <a:round/>
-                    <a:headEnd/>
-                    <a:tailEnd/>
-                  </a:ln>
-                  <a:effectLst>
-                    <a:outerShdw dist="107763" dir="18900000" algn="ctr" rotWithShape="0">
-                      <a:srgbClr val="205867">
-                        <a:alpha val="50000"/>
-                      </a:srgbClr>
-                    </a:outerShdw>
-                  </a:effectLst>
-                </p:spPr>
-                <p:txBody>
-                  <a:bodyPr vert="horz" wrap="square" lIns="91440" tIns="45720" rIns="91440" bIns="45720" numCol="1" anchor="t" anchorCtr="0" compatLnSpc="1">
-                    <a:prstTxWarp prst="textNoShape">
-                      <a:avLst/>
-                    </a:prstTxWarp>
-                  </a:bodyPr>
-                  <a:lstStyle/>
-                  <a:p>
-                    <a:pPr marL="0" marR="0" lvl="0" indent="0" algn="l" defTabSz="914400" rtl="0" eaLnBrk="1" fontAlgn="base" latinLnBrk="0" hangingPunct="1">
-                      <a:lnSpc>
-                        <a:spcPct val="100000"/>
-                      </a:lnSpc>
-                      <a:spcBef>
-                        <a:spcPct val="0"/>
-                      </a:spcBef>
-                      <a:spcAft>
-                        <a:spcPct val="0"/>
-                      </a:spcAft>
-                      <a:buClrTx/>
-                      <a:buSzTx/>
-                      <a:buFontTx/>
-                      <a:buNone/>
-                      <a:tabLst/>
-                    </a:pPr>
-                    <a:r>
-                      <a:rPr kumimoji="0" lang="es-AR" sz="1000" b="0" i="0" u="none" strike="noStrike" cap="none" normalizeH="0" baseline="0" smtClean="0">
-                        <a:ln>
-                          <a:noFill/>
-                        </a:ln>
-                        <a:solidFill>
-                          <a:schemeClr val="tx1"/>
-                        </a:solidFill>
-                        <a:effectLst/>
-                        <a:latin typeface="Arial" pitchFamily="34" charset="0"/>
-                        <a:ea typeface="Times New Roman" pitchFamily="18" charset="0"/>
-                        <a:cs typeface="Arial" pitchFamily="34" charset="0"/>
-                      </a:rPr>
-                      <a:t>&lt;Registry&gt;</a:t>
-                    </a:r>
-                    <a:endParaRPr kumimoji="0" lang="es-AR" sz="800" b="0" i="0" u="none" strike="noStrike" cap="none" normalizeH="0" baseline="0" smtClean="0">
-                      <a:ln>
-                        <a:noFill/>
-                      </a:ln>
-                      <a:solidFill>
-                        <a:schemeClr val="tx1"/>
-                      </a:solidFill>
-                      <a:effectLst/>
-                      <a:latin typeface="Arial" pitchFamily="34" charset="0"/>
-                    </a:endParaRPr>
-                  </a:p>
-                  <a:p>
-                    <a:pPr marL="0" marR="0" lvl="0" indent="0" algn="l" defTabSz="914400" rtl="0" eaLnBrk="0" fontAlgn="base" latinLnBrk="0" hangingPunct="0">
-                      <a:lnSpc>
-                        <a:spcPct val="100000"/>
-                      </a:lnSpc>
-                      <a:spcBef>
-                        <a:spcPct val="0"/>
-                      </a:spcBef>
-                      <a:spcAft>
-                        <a:spcPct val="0"/>
-                      </a:spcAft>
-                      <a:buClrTx/>
-                      <a:buSzTx/>
-                      <a:buFontTx/>
-                      <a:buNone/>
-                      <a:tabLst/>
-                    </a:pPr>
-                    <a:r>
-                      <a:rPr kumimoji="0" lang="es-AR" sz="1000" b="0" i="0" u="none" strike="noStrike" cap="none" normalizeH="0" baseline="0" smtClean="0">
-                        <a:ln>
-                          <a:noFill/>
-                        </a:ln>
-                        <a:solidFill>
-                          <a:schemeClr val="tx1"/>
-                        </a:solidFill>
-                        <a:effectLst/>
-                        <a:latin typeface="Arial" pitchFamily="34" charset="0"/>
-                        <a:ea typeface="Times New Roman" pitchFamily="18" charset="0"/>
-                        <a:cs typeface="Arial" pitchFamily="34" charset="0"/>
-                      </a:rPr>
-                      <a:t>Java JAR</a:t>
-                    </a:r>
-                    <a:endParaRPr kumimoji="0" lang="es-AR" sz="1800" b="0" i="0" u="none" strike="noStrike" cap="none" normalizeH="0" baseline="0" smtClean="0">
-                      <a:ln>
-                        <a:noFill/>
-                      </a:ln>
-                      <a:solidFill>
-                        <a:schemeClr val="tx1"/>
-                      </a:solidFill>
-                      <a:effectLst/>
-                      <a:latin typeface="Arial" pitchFamily="34" charset="0"/>
-                    </a:endParaRPr>
-                  </a:p>
-                </p:txBody>
-              </p:sp>
-              <p:sp>
-                <p:nvSpPr>
-                  <p:cNvPr id="2072" name="AutoShape 24"/>
-                  <p:cNvSpPr>
-                    <a:spLocks noChangeArrowheads="1"/>
-                  </p:cNvSpPr>
-                  <p:nvPr/>
-                </p:nvSpPr>
-                <p:spPr bwMode="auto">
-                  <a:xfrm>
-                    <a:off x="7840" y="6362"/>
-                    <a:ext cx="1875" cy="975"/>
-                  </a:xfrm>
-                  <a:prstGeom prst="roundRect">
-                    <a:avLst>
-                      <a:gd name="adj" fmla="val 16667"/>
-                    </a:avLst>
-                  </a:prstGeom>
-                  <a:gradFill rotWithShape="0">
-                    <a:gsLst>
-                      <a:gs pos="0">
-                        <a:srgbClr val="FFFFFF"/>
-                      </a:gs>
-                      <a:gs pos="100000">
-                        <a:srgbClr val="B6DDE8"/>
-                      </a:gs>
-                    </a:gsLst>
-                    <a:lin ang="5400000" scaled="1"/>
-                  </a:gradFill>
-                  <a:ln w="12700">
-                    <a:solidFill>
-                      <a:srgbClr val="92CDDC"/>
-                    </a:solidFill>
-                    <a:round/>
-                    <a:headEnd/>
-                    <a:tailEnd/>
-                  </a:ln>
-                  <a:effectLst>
-                    <a:outerShdw dist="107763" dir="18900000" algn="ctr" rotWithShape="0">
-                      <a:srgbClr val="205867">
-                        <a:alpha val="50000"/>
-                      </a:srgbClr>
-                    </a:outerShdw>
-                  </a:effectLst>
-                </p:spPr>
-                <p:txBody>
-                  <a:bodyPr vert="horz" wrap="square" lIns="91440" tIns="45720" rIns="91440" bIns="45720" numCol="1" anchor="t" anchorCtr="0" compatLnSpc="1">
-                    <a:prstTxWarp prst="textNoShape">
-                      <a:avLst/>
-                    </a:prstTxWarp>
-                  </a:bodyPr>
-                  <a:lstStyle/>
-                  <a:p>
-                    <a:pPr marL="0" marR="0" lvl="0" indent="0" algn="ctr" defTabSz="914400" rtl="0" eaLnBrk="1" fontAlgn="base" latinLnBrk="0" hangingPunct="1">
-                      <a:lnSpc>
-                        <a:spcPct val="100000"/>
-                      </a:lnSpc>
-                      <a:spcBef>
-                        <a:spcPct val="0"/>
-                      </a:spcBef>
-                      <a:spcAft>
-                        <a:spcPct val="0"/>
-                      </a:spcAft>
-                      <a:buClrTx/>
-                      <a:buSzTx/>
-                      <a:buFontTx/>
-                      <a:buNone/>
-                      <a:tabLst/>
-                    </a:pPr>
-                    <a:r>
-                      <a:rPr kumimoji="0" lang="es-AR" sz="900" b="0" i="0" u="none" strike="noStrike" cap="none" normalizeH="0" baseline="0" smtClean="0">
-                        <a:ln>
-                          <a:noFill/>
-                        </a:ln>
-                        <a:solidFill>
-                          <a:schemeClr val="tx1"/>
-                        </a:solidFill>
-                        <a:effectLst/>
-                        <a:latin typeface="Arial" pitchFamily="34" charset="0"/>
-                        <a:ea typeface="Times New Roman" pitchFamily="18" charset="0"/>
-                        <a:cs typeface="Arial" pitchFamily="34" charset="0"/>
-                      </a:rPr>
-                      <a:t>&lt;DTOs&gt;</a:t>
-                    </a:r>
-                    <a:endParaRPr kumimoji="0" lang="es-AR" sz="800" b="0" i="0" u="none" strike="noStrike" cap="none" normalizeH="0" baseline="0" smtClean="0">
-                      <a:ln>
-                        <a:noFill/>
-                      </a:ln>
-                      <a:solidFill>
-                        <a:schemeClr val="tx1"/>
-                      </a:solidFill>
-                      <a:effectLst/>
-                      <a:latin typeface="Arial" pitchFamily="34" charset="0"/>
-                    </a:endParaRPr>
-                  </a:p>
-                  <a:p>
-                    <a:pPr marL="0" marR="0" lvl="0" indent="0" algn="ctr" defTabSz="914400" rtl="0" eaLnBrk="0" fontAlgn="base" latinLnBrk="0" hangingPunct="0">
-                      <a:lnSpc>
-                        <a:spcPct val="100000"/>
-                      </a:lnSpc>
-                      <a:spcBef>
-                        <a:spcPct val="0"/>
-                      </a:spcBef>
-                      <a:spcAft>
-                        <a:spcPct val="0"/>
-                      </a:spcAft>
-                      <a:buClrTx/>
-                      <a:buSzTx/>
-                      <a:buFontTx/>
-                      <a:buNone/>
-                      <a:tabLst/>
-                    </a:pPr>
-                    <a:r>
-                      <a:rPr kumimoji="0" lang="es-AR" sz="900" b="0" i="0" u="none" strike="noStrike" cap="none" normalizeH="0" baseline="0" smtClean="0">
-                        <a:ln>
-                          <a:noFill/>
-                        </a:ln>
-                        <a:solidFill>
-                          <a:schemeClr val="tx1"/>
-                        </a:solidFill>
-                        <a:effectLst/>
-                        <a:latin typeface="Arial" pitchFamily="34" charset="0"/>
-                        <a:ea typeface="Times New Roman" pitchFamily="18" charset="0"/>
-                        <a:cs typeface="Arial" pitchFamily="34" charset="0"/>
-                      </a:rPr>
-                      <a:t>Java POJOs</a:t>
-                    </a:r>
-                    <a:endParaRPr kumimoji="0" lang="es-AR" sz="1800" b="0" i="0" u="none" strike="noStrike" cap="none" normalizeH="0" baseline="0" smtClean="0">
-                      <a:ln>
-                        <a:noFill/>
-                      </a:ln>
-                      <a:solidFill>
-                        <a:schemeClr val="tx1"/>
-                      </a:solidFill>
-                      <a:effectLst/>
-                      <a:latin typeface="Arial" pitchFamily="34" charset="0"/>
-                    </a:endParaRPr>
-                  </a:p>
-                </p:txBody>
-              </p:sp>
-              <p:sp>
-                <p:nvSpPr>
-                  <p:cNvPr id="2071" name="AutoShape 23"/>
-                  <p:cNvSpPr>
-                    <a:spLocks noChangeArrowheads="1"/>
-                  </p:cNvSpPr>
-                  <p:nvPr/>
-                </p:nvSpPr>
-                <p:spPr bwMode="auto">
-                  <a:xfrm>
-                    <a:off x="7821" y="8204"/>
-                    <a:ext cx="1875" cy="975"/>
-                  </a:xfrm>
-                  <a:prstGeom prst="roundRect">
-                    <a:avLst>
-                      <a:gd name="adj" fmla="val 16667"/>
-                    </a:avLst>
-                  </a:prstGeom>
-                  <a:gradFill rotWithShape="0">
-                    <a:gsLst>
-                      <a:gs pos="0">
-                        <a:srgbClr val="FFFFFF"/>
-                      </a:gs>
-                      <a:gs pos="100000">
-                        <a:srgbClr val="B6DDE8"/>
-                      </a:gs>
-                    </a:gsLst>
-                    <a:lin ang="5400000" scaled="1"/>
-                  </a:gradFill>
-                  <a:ln w="12700">
-                    <a:solidFill>
-                      <a:srgbClr val="92CDDC"/>
-                    </a:solidFill>
-                    <a:round/>
-                    <a:headEnd/>
-                    <a:tailEnd/>
-                  </a:ln>
-                  <a:effectLst>
-                    <a:outerShdw dist="107763" dir="18900000" algn="ctr" rotWithShape="0">
-                      <a:srgbClr val="205867">
-                        <a:alpha val="50000"/>
-                      </a:srgbClr>
-                    </a:outerShdw>
-                  </a:effectLst>
-                </p:spPr>
-                <p:txBody>
-                  <a:bodyPr vert="horz" wrap="square" lIns="91440" tIns="45720" rIns="91440" bIns="45720" numCol="1" anchor="t" anchorCtr="0" compatLnSpc="1">
-                    <a:prstTxWarp prst="textNoShape">
-                      <a:avLst/>
-                    </a:prstTxWarp>
-                  </a:bodyPr>
-                  <a:lstStyle/>
-                  <a:p>
-                    <a:pPr marL="0" marR="0" lvl="0" indent="0" algn="ctr" defTabSz="914400" rtl="0" eaLnBrk="1" fontAlgn="base" latinLnBrk="0" hangingPunct="1">
-                      <a:lnSpc>
-                        <a:spcPct val="100000"/>
-                      </a:lnSpc>
-                      <a:spcBef>
-                        <a:spcPct val="0"/>
-                      </a:spcBef>
-                      <a:spcAft>
-                        <a:spcPct val="0"/>
-                      </a:spcAft>
-                      <a:buClrTx/>
-                      <a:buSzTx/>
-                      <a:buFontTx/>
-                      <a:buNone/>
-                      <a:tabLst/>
-                    </a:pPr>
-                    <a:r>
-                      <a:rPr kumimoji="0" lang="es-AR" sz="900" b="0" i="0" u="none" strike="noStrike" cap="none" normalizeH="0" baseline="0" smtClean="0">
-                        <a:ln>
-                          <a:noFill/>
-                        </a:ln>
-                        <a:solidFill>
-                          <a:schemeClr val="tx1"/>
-                        </a:solidFill>
-                        <a:effectLst/>
-                        <a:latin typeface="Arial" pitchFamily="34" charset="0"/>
-                        <a:ea typeface="Times New Roman" pitchFamily="18" charset="0"/>
-                        <a:cs typeface="Arial" pitchFamily="34" charset="0"/>
-                      </a:rPr>
-                      <a:t>&lt;Reports&gt;</a:t>
-                    </a:r>
-                    <a:endParaRPr kumimoji="0" lang="es-AR" sz="800" b="0" i="0" u="none" strike="noStrike" cap="none" normalizeH="0" baseline="0" smtClean="0">
-                      <a:ln>
-                        <a:noFill/>
-                      </a:ln>
-                      <a:solidFill>
-                        <a:schemeClr val="tx1"/>
-                      </a:solidFill>
-                      <a:effectLst/>
-                      <a:latin typeface="Arial" pitchFamily="34" charset="0"/>
-                    </a:endParaRPr>
-                  </a:p>
-                  <a:p>
-                    <a:pPr marL="0" marR="0" lvl="0" indent="0" algn="ctr" defTabSz="914400" rtl="0" eaLnBrk="0" fontAlgn="base" latinLnBrk="0" hangingPunct="0">
-                      <a:lnSpc>
-                        <a:spcPct val="100000"/>
-                      </a:lnSpc>
-                      <a:spcBef>
-                        <a:spcPct val="0"/>
-                      </a:spcBef>
-                      <a:spcAft>
-                        <a:spcPct val="0"/>
-                      </a:spcAft>
-                      <a:buClrTx/>
-                      <a:buSzTx/>
-                      <a:buFontTx/>
-                      <a:buNone/>
-                      <a:tabLst/>
-                    </a:pPr>
-                    <a:r>
-                      <a:rPr kumimoji="0" lang="es-AR" sz="900" b="0" i="0" u="none" strike="noStrike" cap="none" normalizeH="0" baseline="0" smtClean="0">
-                        <a:ln>
-                          <a:noFill/>
-                        </a:ln>
-                        <a:solidFill>
-                          <a:schemeClr val="tx1"/>
-                        </a:solidFill>
-                        <a:effectLst/>
-                        <a:latin typeface="Arial" pitchFamily="34" charset="0"/>
-                        <a:ea typeface="Times New Roman" pitchFamily="18" charset="0"/>
-                        <a:cs typeface="Arial" pitchFamily="34" charset="0"/>
-                      </a:rPr>
-                      <a:t>Jasper Reports</a:t>
-                    </a:r>
-                    <a:endParaRPr kumimoji="0" lang="es-AR" sz="1800" b="0" i="0" u="none" strike="noStrike" cap="none" normalizeH="0" baseline="0" smtClean="0">
-                      <a:ln>
-                        <a:noFill/>
-                      </a:ln>
-                      <a:solidFill>
-                        <a:schemeClr val="tx1"/>
-                      </a:solidFill>
-                      <a:effectLst/>
-                      <a:latin typeface="Arial" pitchFamily="34" charset="0"/>
-                    </a:endParaRPr>
-                  </a:p>
-                </p:txBody>
-              </p:sp>
-            </p:grpSp>
-            <p:grpSp>
-              <p:nvGrpSpPr>
-                <p:cNvPr id="2066" name="Group 18"/>
-                <p:cNvGrpSpPr>
-                  <a:grpSpLocks/>
-                </p:cNvGrpSpPr>
-                <p:nvPr/>
-              </p:nvGrpSpPr>
-              <p:grpSpPr bwMode="auto">
-                <a:xfrm>
-                  <a:off x="1901" y="8472"/>
-                  <a:ext cx="5187" cy="2179"/>
-                  <a:chOff x="1901" y="8472"/>
-                  <a:chExt cx="5187" cy="2179"/>
-                </a:xfrm>
-              </p:grpSpPr>
-              <p:sp>
-                <p:nvSpPr>
-                  <p:cNvPr id="2069" name="AutoShape 21"/>
-                  <p:cNvSpPr>
-                    <a:spLocks noChangeArrowheads="1"/>
-                  </p:cNvSpPr>
-                  <p:nvPr/>
-                </p:nvSpPr>
-                <p:spPr bwMode="auto">
-                  <a:xfrm>
-                    <a:off x="1901" y="8472"/>
-                    <a:ext cx="5187" cy="2179"/>
-                  </a:xfrm>
-                  <a:prstGeom prst="roundRect">
-                    <a:avLst>
-                      <a:gd name="adj" fmla="val 16667"/>
-                    </a:avLst>
-                  </a:prstGeom>
-                  <a:gradFill rotWithShape="0">
-                    <a:gsLst>
-                      <a:gs pos="0">
-                        <a:srgbClr val="B2A1C7"/>
-                      </a:gs>
-                      <a:gs pos="50000">
-                        <a:srgbClr val="E5DFEC"/>
-                      </a:gs>
-                      <a:gs pos="100000">
-                        <a:srgbClr val="B2A1C7"/>
-                      </a:gs>
-                    </a:gsLst>
-                    <a:lin ang="18900000" scaled="1"/>
-                  </a:gradFill>
-                  <a:ln w="12700">
-                    <a:solidFill>
-                      <a:srgbClr val="B2A1C7"/>
-                    </a:solidFill>
-                    <a:round/>
-                    <a:headEnd/>
-                    <a:tailEnd/>
-                  </a:ln>
-                  <a:effectLst>
-                    <a:outerShdw dist="107763" dir="18900000" algn="ctr" rotWithShape="0">
-                      <a:srgbClr val="3F3151">
-                        <a:alpha val="50000"/>
-                      </a:srgbClr>
-                    </a:outerShdw>
-                  </a:effectLst>
-                </p:spPr>
-                <p:txBody>
-                  <a:bodyPr vert="horz" wrap="square" lIns="91440" tIns="45720" rIns="91440" bIns="45720" numCol="1" anchor="t" anchorCtr="0" compatLnSpc="1">
-                    <a:prstTxWarp prst="textNoShape">
-                      <a:avLst/>
-                    </a:prstTxWarp>
-                  </a:bodyPr>
-                  <a:lstStyle/>
-                  <a:p>
-                    <a:pPr marL="0" marR="0" lvl="0" indent="0" algn="l" defTabSz="914400" rtl="0" eaLnBrk="1" fontAlgn="base" latinLnBrk="0" hangingPunct="1">
-                      <a:lnSpc>
-                        <a:spcPct val="100000"/>
-                      </a:lnSpc>
-                      <a:spcBef>
-                        <a:spcPct val="0"/>
-                      </a:spcBef>
-                      <a:spcAft>
-                        <a:spcPct val="0"/>
-                      </a:spcAft>
-                      <a:buClrTx/>
-                      <a:buSzTx/>
-                      <a:buFontTx/>
-                      <a:buNone/>
-                      <a:tabLst/>
-                    </a:pPr>
-                    <a:r>
-                      <a:rPr kumimoji="0" lang="es-AR" sz="1000" b="0" i="0" u="none" strike="noStrike" cap="none" normalizeH="0" baseline="0" smtClean="0">
-                        <a:ln>
-                          <a:noFill/>
-                        </a:ln>
-                        <a:solidFill>
-                          <a:schemeClr val="tx1"/>
-                        </a:solidFill>
-                        <a:effectLst/>
-                        <a:latin typeface="Arial" pitchFamily="34" charset="0"/>
-                        <a:ea typeface="Times New Roman" pitchFamily="18" charset="0"/>
-                        <a:cs typeface="Arial" pitchFamily="34" charset="0"/>
-                      </a:rPr>
-                      <a:t>&lt;ORM&gt;</a:t>
-                    </a:r>
-                    <a:endParaRPr kumimoji="0" lang="es-AR" sz="800" b="0" i="0" u="none" strike="noStrike" cap="none" normalizeH="0" baseline="0" smtClean="0">
-                      <a:ln>
-                        <a:noFill/>
-                      </a:ln>
-                      <a:solidFill>
-                        <a:schemeClr val="tx1"/>
-                      </a:solidFill>
-                      <a:effectLst/>
-                      <a:latin typeface="Arial" pitchFamily="34" charset="0"/>
-                    </a:endParaRPr>
-                  </a:p>
-                  <a:p>
-                    <a:pPr marL="0" marR="0" lvl="0" indent="0" algn="l" defTabSz="914400" rtl="0" eaLnBrk="0" fontAlgn="base" latinLnBrk="0" hangingPunct="0">
-                      <a:lnSpc>
-                        <a:spcPct val="100000"/>
-                      </a:lnSpc>
-                      <a:spcBef>
-                        <a:spcPct val="0"/>
-                      </a:spcBef>
-                      <a:spcAft>
-                        <a:spcPct val="0"/>
-                      </a:spcAft>
-                      <a:buClrTx/>
-                      <a:buSzTx/>
-                      <a:buFontTx/>
-                      <a:buNone/>
-                      <a:tabLst/>
-                    </a:pPr>
-                    <a:r>
-                      <a:rPr kumimoji="0" lang="es-AR" sz="1000" b="0" i="0" u="none" strike="noStrike" cap="none" normalizeH="0" baseline="0" smtClean="0">
-                        <a:ln>
-                          <a:noFill/>
-                        </a:ln>
-                        <a:solidFill>
-                          <a:schemeClr val="tx1"/>
-                        </a:solidFill>
-                        <a:effectLst/>
-                        <a:latin typeface="Arial" pitchFamily="34" charset="0"/>
-                        <a:ea typeface="Times New Roman" pitchFamily="18" charset="0"/>
-                        <a:cs typeface="Arial" pitchFamily="34" charset="0"/>
-                      </a:rPr>
-                      <a:t>Hibernate</a:t>
-                    </a:r>
-                    <a:endParaRPr kumimoji="0" lang="es-AR" sz="1800" b="0" i="0" u="none" strike="noStrike" cap="none" normalizeH="0" baseline="0" smtClean="0">
-                      <a:ln>
-                        <a:noFill/>
-                      </a:ln>
-                      <a:solidFill>
-                        <a:schemeClr val="tx1"/>
-                      </a:solidFill>
-                      <a:effectLst/>
-                      <a:latin typeface="Arial" pitchFamily="34" charset="0"/>
-                    </a:endParaRPr>
-                  </a:p>
-                </p:txBody>
-              </p:sp>
-              <p:sp>
-                <p:nvSpPr>
-                  <p:cNvPr id="2068" name="AutoShape 20"/>
-                  <p:cNvSpPr>
-                    <a:spLocks noChangeArrowheads="1"/>
-                  </p:cNvSpPr>
-                  <p:nvPr/>
-                </p:nvSpPr>
-                <p:spPr bwMode="auto">
-                  <a:xfrm>
-                    <a:off x="2449" y="9404"/>
-                    <a:ext cx="1875" cy="975"/>
-                  </a:xfrm>
-                  <a:prstGeom prst="roundRect">
-                    <a:avLst>
-                      <a:gd name="adj" fmla="val 16667"/>
-                    </a:avLst>
-                  </a:prstGeom>
-                  <a:gradFill rotWithShape="0">
-                    <a:gsLst>
-                      <a:gs pos="0">
-                        <a:srgbClr val="FFFFFF"/>
-                      </a:gs>
-                      <a:gs pos="100000">
-                        <a:srgbClr val="CCC0D9"/>
-                      </a:gs>
-                    </a:gsLst>
-                    <a:lin ang="5400000" scaled="1"/>
-                  </a:gradFill>
-                  <a:ln w="12700">
-                    <a:solidFill>
-                      <a:srgbClr val="B2A1C7"/>
-                    </a:solidFill>
-                    <a:round/>
-                    <a:headEnd/>
-                    <a:tailEnd/>
-                  </a:ln>
-                  <a:effectLst>
-                    <a:outerShdw dist="107763" dir="18900000" algn="ctr" rotWithShape="0">
-                      <a:srgbClr val="3F3151">
-                        <a:alpha val="50000"/>
-                      </a:srgbClr>
-                    </a:outerShdw>
-                  </a:effectLst>
-                </p:spPr>
-                <p:txBody>
-                  <a:bodyPr vert="horz" wrap="square" lIns="91440" tIns="45720" rIns="91440" bIns="45720" numCol="1" anchor="t" anchorCtr="0" compatLnSpc="1">
-                    <a:prstTxWarp prst="textNoShape">
-                      <a:avLst/>
-                    </a:prstTxWarp>
-                  </a:bodyPr>
-                  <a:lstStyle/>
-                  <a:p>
-                    <a:pPr marL="0" marR="0" lvl="0" indent="0" algn="ctr" defTabSz="914400" rtl="0" eaLnBrk="1" fontAlgn="base" latinLnBrk="0" hangingPunct="1">
-                      <a:lnSpc>
-                        <a:spcPct val="100000"/>
-                      </a:lnSpc>
-                      <a:spcBef>
-                        <a:spcPct val="0"/>
-                      </a:spcBef>
-                      <a:spcAft>
-                        <a:spcPct val="0"/>
-                      </a:spcAft>
-                      <a:buClrTx/>
-                      <a:buSzTx/>
-                      <a:buFontTx/>
-                      <a:buNone/>
-                      <a:tabLst/>
-                    </a:pPr>
-                    <a:r>
-                      <a:rPr kumimoji="0" lang="es-AR" sz="900" b="0" i="0" u="none" strike="noStrike" cap="none" normalizeH="0" baseline="0" smtClean="0">
-                        <a:ln>
-                          <a:noFill/>
-                        </a:ln>
-                        <a:solidFill>
-                          <a:schemeClr val="tx1"/>
-                        </a:solidFill>
-                        <a:effectLst/>
-                        <a:latin typeface="Arial" pitchFamily="34" charset="0"/>
-                        <a:ea typeface="Times New Roman" pitchFamily="18" charset="0"/>
-                        <a:cs typeface="Arial" pitchFamily="34" charset="0"/>
-                      </a:rPr>
-                      <a:t>Mapping Object</a:t>
-                    </a:r>
-                    <a:endParaRPr kumimoji="0" lang="es-AR" sz="1800" b="0" i="0" u="none" strike="noStrike" cap="none" normalizeH="0" baseline="0" smtClean="0">
-                      <a:ln>
-                        <a:noFill/>
-                      </a:ln>
-                      <a:solidFill>
-                        <a:schemeClr val="tx1"/>
-                      </a:solidFill>
-                      <a:effectLst/>
-                      <a:latin typeface="Arial" pitchFamily="34" charset="0"/>
-                    </a:endParaRPr>
-                  </a:p>
-                </p:txBody>
-              </p:sp>
-              <p:sp>
-                <p:nvSpPr>
-                  <p:cNvPr id="2067" name="AutoShape 19"/>
-                  <p:cNvSpPr>
-                    <a:spLocks noChangeArrowheads="1"/>
-                  </p:cNvSpPr>
-                  <p:nvPr/>
-                </p:nvSpPr>
-                <p:spPr bwMode="auto">
-                  <a:xfrm>
-                    <a:off x="4694" y="9387"/>
-                    <a:ext cx="1875" cy="975"/>
-                  </a:xfrm>
-                  <a:prstGeom prst="roundRect">
-                    <a:avLst>
-                      <a:gd name="adj" fmla="val 16667"/>
-                    </a:avLst>
-                  </a:prstGeom>
-                  <a:gradFill rotWithShape="0">
-                    <a:gsLst>
-                      <a:gs pos="0">
-                        <a:srgbClr val="FFFFFF"/>
-                      </a:gs>
-                      <a:gs pos="100000">
-                        <a:srgbClr val="CCC0D9"/>
-                      </a:gs>
-                    </a:gsLst>
-                    <a:lin ang="5400000" scaled="1"/>
-                  </a:gradFill>
-                  <a:ln w="12700">
-                    <a:solidFill>
-                      <a:srgbClr val="B2A1C7"/>
-                    </a:solidFill>
-                    <a:round/>
-                    <a:headEnd/>
-                    <a:tailEnd/>
-                  </a:ln>
-                  <a:effectLst>
-                    <a:outerShdw dist="107763" dir="18900000" algn="ctr" rotWithShape="0">
-                      <a:srgbClr val="3F3151">
-                        <a:alpha val="50000"/>
-                      </a:srgbClr>
-                    </a:outerShdw>
-                  </a:effectLst>
-                </p:spPr>
-                <p:txBody>
-                  <a:bodyPr vert="horz" wrap="square" lIns="91440" tIns="45720" rIns="91440" bIns="45720" numCol="1" anchor="t" anchorCtr="0" compatLnSpc="1">
-                    <a:prstTxWarp prst="textNoShape">
-                      <a:avLst/>
-                    </a:prstTxWarp>
-                  </a:bodyPr>
-                  <a:lstStyle/>
-                  <a:p>
-                    <a:pPr marL="0" marR="0" lvl="0" indent="0" algn="ctr" defTabSz="914400" rtl="0" eaLnBrk="1" fontAlgn="base" latinLnBrk="0" hangingPunct="1">
-                      <a:lnSpc>
-                        <a:spcPct val="100000"/>
-                      </a:lnSpc>
-                      <a:spcBef>
-                        <a:spcPct val="0"/>
-                      </a:spcBef>
-                      <a:spcAft>
-                        <a:spcPct val="0"/>
-                      </a:spcAft>
-                      <a:buClrTx/>
-                      <a:buSzTx/>
-                      <a:buFontTx/>
-                      <a:buNone/>
-                      <a:tabLst/>
-                    </a:pPr>
-                    <a:r>
-                      <a:rPr kumimoji="0" lang="es-AR" sz="900" b="0" i="0" u="none" strike="noStrike" cap="none" normalizeH="0" baseline="0" smtClean="0">
-                        <a:ln>
-                          <a:noFill/>
-                        </a:ln>
-                        <a:solidFill>
-                          <a:schemeClr val="tx1"/>
-                        </a:solidFill>
-                        <a:effectLst/>
-                        <a:latin typeface="Arial" pitchFamily="34" charset="0"/>
-                        <a:ea typeface="Times New Roman" pitchFamily="18" charset="0"/>
-                        <a:cs typeface="Arial" pitchFamily="34" charset="0"/>
-                      </a:rPr>
-                      <a:t>&lt;DAOs&gt;</a:t>
-                    </a:r>
-                    <a:endParaRPr kumimoji="0" lang="es-AR" sz="800" b="0" i="0" u="none" strike="noStrike" cap="none" normalizeH="0" baseline="0" smtClean="0">
-                      <a:ln>
-                        <a:noFill/>
-                      </a:ln>
-                      <a:solidFill>
-                        <a:schemeClr val="tx1"/>
-                      </a:solidFill>
-                      <a:effectLst/>
-                      <a:latin typeface="Arial" pitchFamily="34" charset="0"/>
-                    </a:endParaRPr>
-                  </a:p>
-                  <a:p>
-                    <a:pPr marL="0" marR="0" lvl="0" indent="0" algn="ctr" defTabSz="914400" rtl="0" eaLnBrk="0" fontAlgn="base" latinLnBrk="0" hangingPunct="0">
-                      <a:lnSpc>
-                        <a:spcPct val="100000"/>
-                      </a:lnSpc>
-                      <a:spcBef>
-                        <a:spcPct val="0"/>
-                      </a:spcBef>
-                      <a:spcAft>
-                        <a:spcPct val="0"/>
-                      </a:spcAft>
-                      <a:buClrTx/>
-                      <a:buSzTx/>
-                      <a:buFontTx/>
-                      <a:buNone/>
-                      <a:tabLst/>
-                    </a:pPr>
-                    <a:r>
-                      <a:rPr kumimoji="0" lang="es-AR" sz="900" b="0" i="0" u="none" strike="noStrike" cap="none" normalizeH="0" baseline="0" smtClean="0">
-                        <a:ln>
-                          <a:noFill/>
-                        </a:ln>
-                        <a:solidFill>
-                          <a:schemeClr val="tx1"/>
-                        </a:solidFill>
-                        <a:effectLst/>
-                        <a:latin typeface="Arial" pitchFamily="34" charset="0"/>
-                        <a:ea typeface="Times New Roman" pitchFamily="18" charset="0"/>
-                        <a:cs typeface="Arial" pitchFamily="34" charset="0"/>
-                      </a:rPr>
-                      <a:t>Java</a:t>
-                    </a:r>
-                    <a:endParaRPr kumimoji="0" lang="es-AR" sz="1800" b="0" i="0" u="none" strike="noStrike" cap="none" normalizeH="0" baseline="0" smtClean="0">
-                      <a:ln>
-                        <a:noFill/>
-                      </a:ln>
-                      <a:solidFill>
-                        <a:schemeClr val="tx1"/>
-                      </a:solidFill>
-                      <a:effectLst/>
-                      <a:latin typeface="Arial" pitchFamily="34" charset="0"/>
-                    </a:endParaRPr>
-                  </a:p>
-                </p:txBody>
-              </p:sp>
-            </p:grpSp>
-          </p:grpSp>
-          <p:grpSp>
-            <p:nvGrpSpPr>
-              <p:cNvPr id="2062" name="Group 14"/>
-              <p:cNvGrpSpPr>
-                <a:grpSpLocks/>
-              </p:cNvGrpSpPr>
-              <p:nvPr/>
-            </p:nvGrpSpPr>
-            <p:grpSpPr bwMode="auto">
-              <a:xfrm>
-                <a:off x="1901" y="11490"/>
-                <a:ext cx="5258" cy="1980"/>
-                <a:chOff x="1901" y="11490"/>
-                <a:chExt cx="5258" cy="1980"/>
-              </a:xfrm>
-            </p:grpSpPr>
-            <p:sp>
-              <p:nvSpPr>
-                <p:cNvPr id="2064" name="AutoShape 16"/>
-                <p:cNvSpPr>
-                  <a:spLocks noChangeArrowheads="1"/>
-                </p:cNvSpPr>
-                <p:nvPr/>
-              </p:nvSpPr>
-              <p:spPr bwMode="auto">
-                <a:xfrm>
-                  <a:off x="1901" y="11490"/>
-                  <a:ext cx="5258" cy="1980"/>
-                </a:xfrm>
-                <a:prstGeom prst="roundRect">
-                  <a:avLst>
-                    <a:gd name="adj" fmla="val 16667"/>
-                  </a:avLst>
-                </a:prstGeom>
-                <a:gradFill rotWithShape="0">
-                  <a:gsLst>
-                    <a:gs pos="0">
-                      <a:srgbClr val="D99594"/>
-                    </a:gs>
-                    <a:gs pos="50000">
-                      <a:srgbClr val="F2DBDB"/>
-                    </a:gs>
-                    <a:gs pos="100000">
-                      <a:srgbClr val="D99594"/>
-                    </a:gs>
-                  </a:gsLst>
-                  <a:lin ang="18900000" scaled="1"/>
-                </a:gradFill>
-                <a:ln w="12700">
-                  <a:solidFill>
-                    <a:srgbClr val="D99594"/>
-                  </a:solidFill>
-                  <a:round/>
-                  <a:headEnd/>
-                  <a:tailEnd/>
-                </a:ln>
-                <a:effectLst>
-                  <a:outerShdw dist="107763" dir="18900000" algn="ctr" rotWithShape="0">
-                    <a:srgbClr val="622423">
-                      <a:alpha val="50000"/>
-                    </a:srgbClr>
-                  </a:outerShdw>
-                </a:effectLst>
-              </p:spPr>
-              <p:txBody>
-                <a:bodyPr vert="horz" wrap="square" lIns="91440" tIns="45720" rIns="91440" bIns="45720" numCol="1" anchor="t" anchorCtr="0" compatLnSpc="1">
-                  <a:prstTxWarp prst="textNoShape">
-                    <a:avLst/>
-                  </a:prstTxWarp>
-                </a:bodyPr>
-                <a:lstStyle/>
-                <a:p>
-                  <a:pPr marL="0" marR="0" lvl="0" indent="0" algn="l" defTabSz="914400" rtl="0" eaLnBrk="1" fontAlgn="base" latinLnBrk="0" hangingPunct="1">
-                    <a:lnSpc>
-                      <a:spcPct val="100000"/>
-                    </a:lnSpc>
-                    <a:spcBef>
-                      <a:spcPct val="0"/>
-                    </a:spcBef>
-                    <a:spcAft>
-                      <a:spcPct val="0"/>
-                    </a:spcAft>
-                    <a:buClrTx/>
-                    <a:buSzTx/>
-                    <a:buFontTx/>
-                    <a:buNone/>
-                    <a:tabLst/>
-                  </a:pPr>
-                  <a:r>
-                    <a:rPr kumimoji="0" lang="es-AR" sz="1000" b="0" i="0" u="none" strike="noStrike" cap="none" normalizeH="0" baseline="0" smtClean="0">
-                      <a:ln>
-                        <a:noFill/>
-                      </a:ln>
-                      <a:solidFill>
-                        <a:schemeClr val="tx1"/>
-                      </a:solidFill>
-                      <a:effectLst/>
-                      <a:latin typeface="Arial" pitchFamily="34" charset="0"/>
-                      <a:ea typeface="Times New Roman" pitchFamily="18" charset="0"/>
-                      <a:cs typeface="Arial" pitchFamily="34" charset="0"/>
-                    </a:rPr>
-                    <a:t>&lt;Persistense&gt;</a:t>
-                  </a:r>
-                  <a:endParaRPr kumimoji="0" lang="es-AR" sz="800" b="0" i="0" u="none" strike="noStrike" cap="none" normalizeH="0" baseline="0" smtClean="0">
-                    <a:ln>
-                      <a:noFill/>
-                    </a:ln>
-                    <a:solidFill>
-                      <a:schemeClr val="tx1"/>
-                    </a:solidFill>
-                    <a:effectLst/>
-                    <a:latin typeface="Arial" pitchFamily="34" charset="0"/>
-                  </a:endParaRPr>
-                </a:p>
-                <a:p>
-                  <a:pPr marL="0" marR="0" lvl="0" indent="0" algn="l" defTabSz="914400" rtl="0" eaLnBrk="0" fontAlgn="base" latinLnBrk="0" hangingPunct="0">
-                    <a:lnSpc>
-                      <a:spcPct val="100000"/>
-                    </a:lnSpc>
-                    <a:spcBef>
-                      <a:spcPct val="0"/>
-                    </a:spcBef>
-                    <a:spcAft>
-                      <a:spcPct val="0"/>
-                    </a:spcAft>
-                    <a:buClrTx/>
-                    <a:buSzTx/>
-                    <a:buFontTx/>
-                    <a:buNone/>
-                    <a:tabLst/>
-                  </a:pPr>
-                  <a:r>
-                    <a:rPr kumimoji="0" lang="es-AR" sz="1000" b="0" i="0" u="none" strike="noStrike" cap="none" normalizeH="0" baseline="0" smtClean="0">
-                      <a:ln>
-                        <a:noFill/>
-                      </a:ln>
-                      <a:solidFill>
-                        <a:schemeClr val="tx1"/>
-                      </a:solidFill>
-                      <a:effectLst/>
-                      <a:latin typeface="Arial" pitchFamily="34" charset="0"/>
-                      <a:ea typeface="Times New Roman" pitchFamily="18" charset="0"/>
-                      <a:cs typeface="Arial" pitchFamily="34" charset="0"/>
-                    </a:rPr>
-                    <a:t>MySQL</a:t>
-                  </a:r>
-                  <a:endParaRPr kumimoji="0" lang="es-AR" sz="1800" b="0" i="0" u="none" strike="noStrike" cap="none" normalizeH="0" baseline="0" smtClean="0">
-                    <a:ln>
-                      <a:noFill/>
-                    </a:ln>
-                    <a:solidFill>
-                      <a:schemeClr val="tx1"/>
-                    </a:solidFill>
-                    <a:effectLst/>
-                    <a:latin typeface="Arial" pitchFamily="34" charset="0"/>
-                  </a:endParaRPr>
-                </a:p>
-              </p:txBody>
-            </p:sp>
-            <p:sp>
-              <p:nvSpPr>
-                <p:cNvPr id="2063" name="AutoShape 15"/>
-                <p:cNvSpPr>
-                  <a:spLocks noChangeArrowheads="1"/>
-                </p:cNvSpPr>
-                <p:nvPr/>
-              </p:nvSpPr>
-              <p:spPr bwMode="auto">
-                <a:xfrm>
-                  <a:off x="4134" y="12159"/>
-                  <a:ext cx="1875" cy="975"/>
-                </a:xfrm>
-                <a:prstGeom prst="roundRect">
-                  <a:avLst>
-                    <a:gd name="adj" fmla="val 16667"/>
-                  </a:avLst>
-                </a:prstGeom>
-                <a:gradFill rotWithShape="0">
-                  <a:gsLst>
-                    <a:gs pos="0">
-                      <a:srgbClr val="FFFFFF"/>
-                    </a:gs>
-                    <a:gs pos="100000">
-                      <a:srgbClr val="E5B8B7"/>
-                    </a:gs>
-                  </a:gsLst>
-                  <a:lin ang="5400000" scaled="1"/>
-                </a:gradFill>
-                <a:ln w="12700">
-                  <a:solidFill>
-                    <a:srgbClr val="D99594"/>
-                  </a:solidFill>
-                  <a:round/>
-                  <a:headEnd/>
-                  <a:tailEnd/>
-                </a:ln>
-                <a:effectLst>
-                  <a:outerShdw dist="107763" dir="18900000" algn="ctr" rotWithShape="0">
-                    <a:srgbClr val="622423">
-                      <a:alpha val="50000"/>
-                    </a:srgbClr>
-                  </a:outerShdw>
-                </a:effectLst>
-              </p:spPr>
-              <p:txBody>
-                <a:bodyPr vert="horz" wrap="square" lIns="91440" tIns="45720" rIns="91440" bIns="45720" numCol="1" anchor="t" anchorCtr="0" compatLnSpc="1">
-                  <a:prstTxWarp prst="textNoShape">
-                    <a:avLst/>
-                  </a:prstTxWarp>
-                </a:bodyPr>
-                <a:lstStyle/>
-                <a:p>
-                  <a:pPr marL="0" marR="0" lvl="0" indent="0" algn="ctr" defTabSz="914400" rtl="0" eaLnBrk="1" fontAlgn="base" latinLnBrk="0" hangingPunct="1">
-                    <a:lnSpc>
-                      <a:spcPct val="100000"/>
-                    </a:lnSpc>
-                    <a:spcBef>
-                      <a:spcPct val="0"/>
-                    </a:spcBef>
-                    <a:spcAft>
-                      <a:spcPct val="0"/>
-                    </a:spcAft>
-                    <a:buClrTx/>
-                    <a:buSzTx/>
-                    <a:buFontTx/>
-                    <a:buNone/>
-                    <a:tabLst/>
-                  </a:pPr>
-                  <a:r>
-                    <a:rPr kumimoji="0" lang="es-AR" sz="900" b="0" i="0" u="none" strike="noStrike" cap="none" normalizeH="0" baseline="0" smtClean="0">
-                      <a:ln>
-                        <a:noFill/>
-                      </a:ln>
-                      <a:solidFill>
-                        <a:schemeClr val="tx1"/>
-                      </a:solidFill>
-                      <a:effectLst/>
-                      <a:latin typeface="Arial" pitchFamily="34" charset="0"/>
-                      <a:ea typeface="Times New Roman" pitchFamily="18" charset="0"/>
-                      <a:cs typeface="Arial" pitchFamily="34" charset="0"/>
-                    </a:rPr>
-                    <a:t>&lt;Schema&gt;</a:t>
-                  </a:r>
-                  <a:endParaRPr kumimoji="0" lang="es-AR" sz="800" b="0" i="0" u="none" strike="noStrike" cap="none" normalizeH="0" baseline="0" smtClean="0">
-                    <a:ln>
-                      <a:noFill/>
-                    </a:ln>
-                    <a:solidFill>
-                      <a:schemeClr val="tx1"/>
-                    </a:solidFill>
-                    <a:effectLst/>
-                    <a:latin typeface="Arial" pitchFamily="34" charset="0"/>
-                  </a:endParaRPr>
-                </a:p>
-                <a:p>
-                  <a:pPr marL="0" marR="0" lvl="0" indent="0" algn="ctr" defTabSz="914400" rtl="0" eaLnBrk="0" fontAlgn="base" latinLnBrk="0" hangingPunct="0">
-                    <a:lnSpc>
-                      <a:spcPct val="100000"/>
-                    </a:lnSpc>
-                    <a:spcBef>
-                      <a:spcPct val="0"/>
-                    </a:spcBef>
-                    <a:spcAft>
-                      <a:spcPct val="0"/>
-                    </a:spcAft>
-                    <a:buClrTx/>
-                    <a:buSzTx/>
-                    <a:buFontTx/>
-                    <a:buNone/>
-                    <a:tabLst/>
-                  </a:pPr>
-                  <a:r>
-                    <a:rPr kumimoji="0" lang="es-AR" sz="900" b="0" i="0" u="none" strike="noStrike" cap="none" normalizeH="0" baseline="0" smtClean="0">
-                      <a:ln>
-                        <a:noFill/>
-                      </a:ln>
-                      <a:solidFill>
-                        <a:schemeClr val="tx1"/>
-                      </a:solidFill>
-                      <a:effectLst/>
-                      <a:latin typeface="Arial" pitchFamily="34" charset="0"/>
-                      <a:ea typeface="Times New Roman" pitchFamily="18" charset="0"/>
-                      <a:cs typeface="Arial" pitchFamily="34" charset="0"/>
-                    </a:rPr>
-                    <a:t>Tempore Schema</a:t>
-                  </a:r>
-                  <a:endParaRPr kumimoji="0" lang="es-AR" sz="1800" b="0" i="0" u="none" strike="noStrike" cap="none" normalizeH="0" baseline="0" smtClean="0">
-                    <a:ln>
-                      <a:noFill/>
-                    </a:ln>
-                    <a:solidFill>
-                      <a:schemeClr val="tx1"/>
-                    </a:solidFill>
-                    <a:effectLst/>
-                    <a:latin typeface="Arial" pitchFamily="34" charset="0"/>
-                  </a:endParaRPr>
-                </a:p>
-              </p:txBody>
-            </p:sp>
-          </p:grpSp>
-        </p:grpSp>
-        <p:sp>
-          <p:nvSpPr>
-            <p:cNvPr id="2060" name="AutoShape 12"/>
-            <p:cNvSpPr>
-              <a:spLocks noChangeShapeType="1"/>
-            </p:cNvSpPr>
-            <p:nvPr/>
-          </p:nvSpPr>
-          <p:spPr bwMode="auto">
-            <a:xfrm>
-              <a:off x="5678" y="3574"/>
-              <a:ext cx="0" cy="2266"/>
-            </a:xfrm>
-            <a:prstGeom prst="straightConnector1">
-              <a:avLst/>
-            </a:prstGeom>
-            <a:noFill/>
-            <a:ln w="9525">
-              <a:solidFill>
-                <a:srgbClr val="000000"/>
-              </a:solidFill>
-              <a:round/>
-              <a:headEnd/>
-              <a:tailEnd type="triangle" w="med" len="med"/>
-            </a:ln>
-          </p:spPr>
-          <p:txBody>
-            <a:bodyPr vert="horz" wrap="square" lIns="91440" tIns="45720" rIns="91440" bIns="45720" numCol="1" anchor="t" anchorCtr="0" compatLnSpc="1">
-              <a:prstTxWarp prst="textNoShape">
-                <a:avLst/>
-              </a:prstTxWarp>
-            </a:bodyPr>
-            <a:lstStyle/>
-            <a:p>
-              <a:endParaRPr lang="en-US"/>
-            </a:p>
-          </p:txBody>
-        </p:sp>
-        <p:sp>
-          <p:nvSpPr>
-            <p:cNvPr id="2059" name="AutoShape 11"/>
-            <p:cNvSpPr>
-              <a:spLocks noChangeShapeType="1"/>
-            </p:cNvSpPr>
-            <p:nvPr/>
-          </p:nvSpPr>
-          <p:spPr bwMode="auto">
-            <a:xfrm>
-              <a:off x="3464" y="3574"/>
-              <a:ext cx="1766" cy="2266"/>
-            </a:xfrm>
-            <a:prstGeom prst="straightConnector1">
-              <a:avLst/>
-            </a:prstGeom>
-            <a:noFill/>
-            <a:ln w="9525">
-              <a:solidFill>
-                <a:srgbClr val="000000"/>
-              </a:solidFill>
-              <a:round/>
-              <a:headEnd/>
-              <a:tailEnd type="triangle" w="med" len="med"/>
-            </a:ln>
-          </p:spPr>
-          <p:txBody>
-            <a:bodyPr vert="horz" wrap="square" lIns="91440" tIns="45720" rIns="91440" bIns="45720" numCol="1" anchor="t" anchorCtr="0" compatLnSpc="1">
-              <a:prstTxWarp prst="textNoShape">
-                <a:avLst/>
-              </a:prstTxWarp>
-            </a:bodyPr>
-            <a:lstStyle/>
-            <a:p>
-              <a:endParaRPr lang="en-US"/>
-            </a:p>
-          </p:txBody>
-        </p:sp>
-        <p:sp>
-          <p:nvSpPr>
-            <p:cNvPr id="2058" name="AutoShape 10"/>
-            <p:cNvSpPr>
-              <a:spLocks noChangeShapeType="1"/>
-            </p:cNvSpPr>
-            <p:nvPr/>
-          </p:nvSpPr>
-          <p:spPr bwMode="auto">
-            <a:xfrm flipH="1">
-              <a:off x="4134" y="6362"/>
-              <a:ext cx="636" cy="0"/>
-            </a:xfrm>
-            <a:prstGeom prst="straightConnector1">
-              <a:avLst/>
-            </a:prstGeom>
-            <a:noFill/>
-            <a:ln w="9525">
-              <a:solidFill>
-                <a:srgbClr val="000000"/>
-              </a:solidFill>
-              <a:round/>
-              <a:headEnd/>
-              <a:tailEnd type="triangle" w="med" len="med"/>
-            </a:ln>
-          </p:spPr>
-          <p:txBody>
-            <a:bodyPr vert="horz" wrap="square" lIns="91440" tIns="45720" rIns="91440" bIns="45720" numCol="1" anchor="t" anchorCtr="0" compatLnSpc="1">
-              <a:prstTxWarp prst="textNoShape">
-                <a:avLst/>
-              </a:prstTxWarp>
-            </a:bodyPr>
-            <a:lstStyle/>
-            <a:p>
-              <a:endParaRPr lang="en-US"/>
-            </a:p>
-          </p:txBody>
-        </p:sp>
-        <p:sp>
-          <p:nvSpPr>
-            <p:cNvPr id="2057" name="AutoShape 9"/>
-            <p:cNvSpPr>
-              <a:spLocks noChangeShapeType="1"/>
-            </p:cNvSpPr>
-            <p:nvPr/>
-          </p:nvSpPr>
-          <p:spPr bwMode="auto">
-            <a:xfrm>
-              <a:off x="7088" y="6362"/>
-              <a:ext cx="562" cy="0"/>
-            </a:xfrm>
-            <a:prstGeom prst="straightConnector1">
-              <a:avLst/>
-            </a:prstGeom>
-            <a:noFill/>
-            <a:ln w="9525">
-              <a:solidFill>
-                <a:srgbClr val="000000"/>
-              </a:solidFill>
-              <a:round/>
-              <a:headEnd/>
-              <a:tailEnd type="triangle" w="med" len="med"/>
-            </a:ln>
-          </p:spPr>
-          <p:txBody>
-            <a:bodyPr vert="horz" wrap="square" lIns="91440" tIns="45720" rIns="91440" bIns="45720" numCol="1" anchor="t" anchorCtr="0" compatLnSpc="1">
-              <a:prstTxWarp prst="textNoShape">
-                <a:avLst/>
-              </a:prstTxWarp>
-            </a:bodyPr>
-            <a:lstStyle/>
-            <a:p>
-              <a:endParaRPr lang="en-US"/>
-            </a:p>
-          </p:txBody>
-        </p:sp>
-        <p:sp>
-          <p:nvSpPr>
-            <p:cNvPr id="2056" name="AutoShape 8"/>
-            <p:cNvSpPr>
-              <a:spLocks noChangeShapeType="1"/>
-            </p:cNvSpPr>
-            <p:nvPr/>
-          </p:nvSpPr>
-          <p:spPr bwMode="auto">
-            <a:xfrm>
-              <a:off x="7088" y="9550"/>
-              <a:ext cx="562" cy="0"/>
-            </a:xfrm>
-            <a:prstGeom prst="straightConnector1">
-              <a:avLst/>
-            </a:prstGeom>
-            <a:noFill/>
-            <a:ln w="9525">
-              <a:solidFill>
-                <a:srgbClr val="000000"/>
-              </a:solidFill>
-              <a:round/>
-              <a:headEnd/>
-              <a:tailEnd type="triangle" w="med" len="med"/>
-            </a:ln>
-          </p:spPr>
-          <p:txBody>
-            <a:bodyPr vert="horz" wrap="square" lIns="91440" tIns="45720" rIns="91440" bIns="45720" numCol="1" anchor="t" anchorCtr="0" compatLnSpc="1">
-              <a:prstTxWarp prst="textNoShape">
-                <a:avLst/>
-              </a:prstTxWarp>
-            </a:bodyPr>
-            <a:lstStyle/>
-            <a:p>
-              <a:endParaRPr lang="en-US"/>
-            </a:p>
-          </p:txBody>
-        </p:sp>
-        <p:sp>
-          <p:nvSpPr>
-            <p:cNvPr id="2055" name="AutoShape 7"/>
-            <p:cNvSpPr>
-              <a:spLocks noChangeShapeType="1"/>
-            </p:cNvSpPr>
-            <p:nvPr/>
-          </p:nvSpPr>
-          <p:spPr bwMode="auto">
-            <a:xfrm>
-              <a:off x="5678" y="6815"/>
-              <a:ext cx="0" cy="2572"/>
-            </a:xfrm>
-            <a:prstGeom prst="straightConnector1">
-              <a:avLst/>
-            </a:prstGeom>
-            <a:noFill/>
-            <a:ln w="9525">
-              <a:solidFill>
-                <a:srgbClr val="000000"/>
-              </a:solidFill>
-              <a:round/>
-              <a:headEnd/>
-              <a:tailEnd type="triangle" w="med" len="med"/>
-            </a:ln>
-          </p:spPr>
-          <p:txBody>
-            <a:bodyPr vert="horz" wrap="square" lIns="91440" tIns="45720" rIns="91440" bIns="45720" numCol="1" anchor="t" anchorCtr="0" compatLnSpc="1">
-              <a:prstTxWarp prst="textNoShape">
-                <a:avLst/>
-              </a:prstTxWarp>
-            </a:bodyPr>
-            <a:lstStyle/>
-            <a:p>
-              <a:endParaRPr lang="en-US"/>
-            </a:p>
-          </p:txBody>
-        </p:sp>
-        <p:sp>
-          <p:nvSpPr>
-            <p:cNvPr id="2054" name="AutoShape 6"/>
-            <p:cNvSpPr>
-              <a:spLocks noChangeShapeType="1"/>
-            </p:cNvSpPr>
-            <p:nvPr/>
-          </p:nvSpPr>
-          <p:spPr bwMode="auto">
-            <a:xfrm flipH="1">
-              <a:off x="5149" y="10362"/>
-              <a:ext cx="529" cy="1797"/>
-            </a:xfrm>
-            <a:prstGeom prst="straightConnector1">
-              <a:avLst/>
-            </a:prstGeom>
-            <a:noFill/>
-            <a:ln w="9525">
-              <a:solidFill>
-                <a:srgbClr val="000000"/>
-              </a:solidFill>
-              <a:round/>
-              <a:headEnd/>
-              <a:tailEnd type="triangle" w="med" len="med"/>
-            </a:ln>
-          </p:spPr>
-          <p:txBody>
-            <a:bodyPr vert="horz" wrap="square" lIns="91440" tIns="45720" rIns="91440" bIns="45720" numCol="1" anchor="t" anchorCtr="0" compatLnSpc="1">
-              <a:prstTxWarp prst="textNoShape">
-                <a:avLst/>
-              </a:prstTxWarp>
-            </a:bodyPr>
-            <a:lstStyle/>
-            <a:p>
-              <a:endParaRPr lang="en-US"/>
-            </a:p>
-          </p:txBody>
-        </p:sp>
-        <p:sp>
-          <p:nvSpPr>
-            <p:cNvPr id="2053" name="AutoShape 5"/>
-            <p:cNvSpPr>
-              <a:spLocks noChangeShapeType="1"/>
-            </p:cNvSpPr>
-            <p:nvPr/>
-          </p:nvSpPr>
-          <p:spPr bwMode="auto">
-            <a:xfrm flipH="1">
-              <a:off x="4324" y="9849"/>
-              <a:ext cx="370" cy="0"/>
-            </a:xfrm>
-            <a:prstGeom prst="straightConnector1">
-              <a:avLst/>
-            </a:prstGeom>
-            <a:noFill/>
-            <a:ln w="9525">
-              <a:solidFill>
-                <a:srgbClr val="000000"/>
-              </a:solidFill>
-              <a:round/>
-              <a:headEnd/>
-              <a:tailEnd type="triangle" w="med" len="med"/>
-            </a:ln>
-          </p:spPr>
-          <p:txBody>
-            <a:bodyPr vert="horz" wrap="square" lIns="91440" tIns="45720" rIns="91440" bIns="45720" numCol="1" anchor="t" anchorCtr="0" compatLnSpc="1">
-              <a:prstTxWarp prst="textNoShape">
-                <a:avLst/>
-              </a:prstTxWarp>
-            </a:bodyPr>
-            <a:lstStyle/>
-            <a:p>
-              <a:endParaRPr lang="en-US"/>
-            </a:p>
-          </p:txBody>
-        </p:sp>
-        <p:sp>
-          <p:nvSpPr>
-            <p:cNvPr id="2052" name="AutoShape 4"/>
-            <p:cNvSpPr>
-              <a:spLocks noChangeShapeType="1"/>
-            </p:cNvSpPr>
-            <p:nvPr/>
-          </p:nvSpPr>
-          <p:spPr bwMode="auto">
-            <a:xfrm flipH="1">
-              <a:off x="4134" y="6815"/>
-              <a:ext cx="636" cy="412"/>
-            </a:xfrm>
-            <a:prstGeom prst="straightConnector1">
-              <a:avLst/>
-            </a:prstGeom>
-            <a:noFill/>
-            <a:ln w="9525">
-              <a:solidFill>
-                <a:srgbClr val="000000"/>
-              </a:solidFill>
-              <a:round/>
-              <a:headEnd/>
-              <a:tailEnd type="triangle" w="med" len="med"/>
-            </a:ln>
-          </p:spPr>
-          <p:txBody>
-            <a:bodyPr vert="horz" wrap="square" lIns="91440" tIns="45720" rIns="91440" bIns="45720" numCol="1" anchor="t" anchorCtr="0" compatLnSpc="1">
-              <a:prstTxWarp prst="textNoShape">
-                <a:avLst/>
-              </a:prstTxWarp>
-            </a:bodyPr>
-            <a:lstStyle/>
-            <a:p>
-              <a:endParaRPr lang="en-US"/>
-            </a:p>
-          </p:txBody>
-        </p:sp>
-      </p:grpSp>
-      <p:sp>
-        <p:nvSpPr>
-          <p:cNvPr id="2101" name="Rectangle 53"/>
-          <p:cNvSpPr>
-            <a:spLocks noChangeArrowheads="1"/>
-          </p:cNvSpPr>
-          <p:nvPr/>
-        </p:nvSpPr>
-        <p:spPr bwMode="auto">
-          <a:xfrm>
-            <a:off x="0" y="6711950"/>
-            <a:ext cx="9144000" cy="457200"/>
-          </a:xfrm>
-          <a:prstGeom prst="rect">
-            <a:avLst/>
-          </a:prstGeom>
-          <a:noFill/>
-          <a:ln w="12700" cap="sq" cmpd="sng">
-            <a:noFill/>
-            <a:prstDash val="solid"/>
-            <a:miter lim="800000"/>
-            <a:headEnd type="none" w="sm" len="sm"/>
-            <a:tailEnd type="none" w="sm" len="sm"/>
-          </a:ln>
-          <a:effectLst/>
-        </p:spPr>
-        <p:txBody>
-          <a:bodyPr vert="horz" wrap="none" lIns="91440" tIns="45720" rIns="91440" bIns="45720" numCol="1" anchor="ctr" anchorCtr="0" compatLnSpc="1">
-            <a:prstTxWarp prst="textNoShape">
-              <a:avLst/>
-            </a:prstTxWarp>
-            <a:spAutoFit/>
-          </a:bodyPr>
-          <a:lstStyle/>
-          <a:p>
-            <a:pPr marL="0" marR="0" lvl="0" indent="0" algn="l" defTabSz="914400" rtl="0" eaLnBrk="1" fontAlgn="base" latinLnBrk="0" hangingPunct="1">
-              <a:lnSpc>
-                <a:spcPct val="100000"/>
-              </a:lnSpc>
-              <a:spcBef>
-                <a:spcPct val="0"/>
-              </a:spcBef>
-              <a:spcAft>
-                <a:spcPct val="0"/>
-              </a:spcAft>
-              <a:buClrTx/>
-              <a:buSzTx/>
-              <a:buFontTx/>
-              <a:buNone/>
-              <a:tabLst/>
-            </a:pPr>
-            <a:endParaRPr kumimoji="0" lang="en-US" sz="1800" b="0" i="0" u="none" strike="noStrike" cap="none" normalizeH="0" baseline="0" smtClean="0">
-              <a:ln>
-                <a:noFill/>
-              </a:ln>
-              <a:solidFill>
-                <a:schemeClr val="tx1"/>
-              </a:solidFill>
-              <a:effectLst/>
-              <a:latin typeface="Arial" pitchFamily="34" charset="0"/>
-            </a:endParaRPr>
+            <a:pPr lvl="0"/>
+            <a:r>
+              <a:rPr lang="es-ES" sz="2800" b="1" dirty="0" err="1"/>
+              <a:t>Frameworks</a:t>
+            </a:r>
+            <a:r>
+              <a:rPr lang="es-ES" sz="2800" b="1" dirty="0"/>
+              <a:t>:</a:t>
+            </a:r>
+            <a:endParaRPr lang="en-US" sz="2800" dirty="0"/>
+          </a:p>
+          <a:p>
+            <a:pPr lvl="1"/>
+            <a:r>
+              <a:rPr lang="es-ES" i="1" dirty="0"/>
+              <a:t>GWT (RIA) </a:t>
+            </a:r>
+            <a:endParaRPr lang="en-US" dirty="0"/>
+          </a:p>
+          <a:p>
+            <a:pPr lvl="1"/>
+            <a:r>
+              <a:rPr lang="es-ES" i="1" dirty="0"/>
+              <a:t>Spring (Patrón MVC) </a:t>
+            </a:r>
+            <a:endParaRPr lang="en-US" dirty="0"/>
+          </a:p>
+          <a:p>
+            <a:pPr lvl="1"/>
+            <a:r>
+              <a:rPr lang="es-ES" i="1" dirty="0" err="1"/>
+              <a:t>Hibernate</a:t>
+            </a:r>
+            <a:r>
+              <a:rPr lang="es-ES" i="1" dirty="0"/>
+              <a:t> </a:t>
+            </a:r>
+            <a:r>
+              <a:rPr lang="es-ES" dirty="0"/>
+              <a:t>(ORM)  </a:t>
+            </a:r>
+            <a:endParaRPr lang="en-US" dirty="0"/>
+          </a:p>
+          <a:p>
+            <a:pPr lvl="1"/>
+            <a:r>
+              <a:rPr lang="es-ES" i="1" dirty="0" err="1"/>
+              <a:t>Jasper</a:t>
+            </a:r>
+            <a:r>
+              <a:rPr lang="es-ES" i="1" dirty="0"/>
+              <a:t> </a:t>
+            </a:r>
+            <a:r>
+              <a:rPr lang="es-ES" i="1" dirty="0" err="1"/>
+              <a:t>Report</a:t>
+            </a:r>
+            <a:r>
+              <a:rPr lang="es-ES" i="1" dirty="0"/>
+              <a:t> </a:t>
+            </a:r>
+            <a:r>
+              <a:rPr lang="es-ES" dirty="0"/>
+              <a:t>(Reportes)</a:t>
+            </a:r>
+            <a:r>
+              <a:rPr lang="es-ES" i="1" dirty="0"/>
+              <a:t> </a:t>
+            </a:r>
+            <a:endParaRPr lang="en-US" dirty="0"/>
+          </a:p>
+          <a:p>
+            <a:pPr lvl="1"/>
+            <a:r>
+              <a:rPr lang="es-ES" i="1" dirty="0"/>
+              <a:t>log4j </a:t>
+            </a:r>
+            <a:endParaRPr lang="en-US" dirty="0"/>
+          </a:p>
+          <a:p>
+            <a:pPr lvl="0"/>
+            <a:r>
+              <a:rPr lang="es-ES" sz="2800" b="1" dirty="0"/>
+              <a:t>Servidor Web: </a:t>
+            </a:r>
+            <a:r>
+              <a:rPr lang="es-ES" sz="2800" dirty="0"/>
+              <a:t>Apache </a:t>
+            </a:r>
+            <a:r>
+              <a:rPr lang="es-ES" sz="2800" dirty="0" err="1"/>
+              <a:t>Tomcat</a:t>
+            </a:r>
+            <a:r>
+              <a:rPr lang="es-ES" sz="2800" dirty="0"/>
+              <a:t> 6.0</a:t>
+            </a:r>
+            <a:r>
+              <a:rPr lang="es-ES" sz="2800" b="1" dirty="0"/>
+              <a:t> </a:t>
+            </a:r>
+            <a:endParaRPr lang="en-US" sz="2800" dirty="0"/>
+          </a:p>
+          <a:p>
+            <a:pPr lvl="0"/>
+            <a:r>
+              <a:rPr lang="es-ES" sz="2800" b="1" dirty="0"/>
+              <a:t>Base de Datos: </a:t>
+            </a:r>
+            <a:r>
+              <a:rPr lang="es-ES" sz="2800" dirty="0" err="1"/>
+              <a:t>MySQL</a:t>
+            </a:r>
+            <a:r>
+              <a:rPr lang="es-ES" sz="2800" b="1" dirty="0"/>
+              <a:t> </a:t>
+            </a:r>
+            <a:endParaRPr lang="en-US" sz="2800" dirty="0"/>
           </a:p>
         </p:txBody>
       </p:sp>
@@ -6920,13 +4234,6 @@
   <p:clrMapOvr>
     <a:masterClrMapping/>
   </p:clrMapOvr>
-  <p:timing>
-    <p:tnLst>
-      <p:par>
-        <p:cTn id="1" dur="indefinite" restart="never" nodeType="tmRoot"/>
-      </p:par>
-    </p:tnLst>
-  </p:timing>
 </p:sld>
 </file>
 
@@ -6964,7 +4271,7 @@
           <a:p>
             <a:r>
               <a:rPr lang="es-ES" dirty="0" smtClean="0"/>
-              <a:t>Tecnología</a:t>
+              <a:t>Estimación</a:t>
             </a:r>
             <a:endParaRPr lang="en-US" dirty="0"/>
           </a:p>
@@ -6985,124 +4292,7 @@
           <a:bodyPr/>
           <a:lstStyle/>
           <a:p>
-            <a:pPr lvl="0"/>
-            <a:r>
-              <a:rPr lang="es-ES" sz="2800" b="1" dirty="0" err="1"/>
-              <a:t>Frameworks</a:t>
-            </a:r>
-            <a:r>
-              <a:rPr lang="es-ES" sz="2800" b="1" dirty="0"/>
-              <a:t>:</a:t>
-            </a:r>
-            <a:endParaRPr lang="en-US" sz="2800" dirty="0"/>
-          </a:p>
-          <a:p>
-            <a:pPr lvl="1"/>
-            <a:r>
-              <a:rPr lang="es-ES" i="1" dirty="0"/>
-              <a:t>GWT (RIA) </a:t>
-            </a:r>
-            <a:endParaRPr lang="en-US" dirty="0"/>
-          </a:p>
-          <a:p>
-            <a:pPr lvl="1"/>
-            <a:r>
-              <a:rPr lang="es-ES" i="1" dirty="0"/>
-              <a:t>Spring (Patrón MVC) </a:t>
-            </a:r>
-            <a:endParaRPr lang="en-US" dirty="0"/>
-          </a:p>
-          <a:p>
-            <a:pPr lvl="1"/>
-            <a:r>
-              <a:rPr lang="es-ES" i="1" dirty="0" err="1"/>
-              <a:t>Hibernate</a:t>
-            </a:r>
-            <a:r>
-              <a:rPr lang="es-ES" i="1" dirty="0"/>
-              <a:t> </a:t>
-            </a:r>
-            <a:r>
-              <a:rPr lang="es-ES" dirty="0"/>
-              <a:t>(ORM)  </a:t>
-            </a:r>
-            <a:endParaRPr lang="en-US" dirty="0"/>
-          </a:p>
-          <a:p>
-            <a:pPr lvl="1"/>
-            <a:r>
-              <a:rPr lang="es-ES" i="1" dirty="0" err="1"/>
-              <a:t>Jasper</a:t>
-            </a:r>
-            <a:r>
-              <a:rPr lang="es-ES" i="1" dirty="0"/>
-              <a:t> </a:t>
-            </a:r>
-            <a:r>
-              <a:rPr lang="es-ES" i="1" dirty="0" err="1"/>
-              <a:t>Report</a:t>
-            </a:r>
-            <a:r>
-              <a:rPr lang="es-ES" i="1" dirty="0"/>
-              <a:t> </a:t>
-            </a:r>
-            <a:r>
-              <a:rPr lang="es-ES" dirty="0"/>
-              <a:t>(Reportes)</a:t>
-            </a:r>
-            <a:r>
-              <a:rPr lang="es-ES" i="1" dirty="0"/>
-              <a:t> </a:t>
-            </a:r>
-            <a:endParaRPr lang="en-US" dirty="0"/>
-          </a:p>
-          <a:p>
-            <a:pPr lvl="1"/>
-            <a:r>
-              <a:rPr lang="es-ES" i="1" dirty="0"/>
-              <a:t>log4j </a:t>
-            </a:r>
-            <a:endParaRPr lang="en-US" dirty="0"/>
-          </a:p>
-          <a:p>
-            <a:pPr lvl="0"/>
-            <a:r>
-              <a:rPr lang="es-ES" sz="2800" b="1" dirty="0"/>
-              <a:t>Servidor Web: </a:t>
-            </a:r>
-            <a:r>
-              <a:rPr lang="es-ES" sz="2800" dirty="0"/>
-              <a:t>Apache </a:t>
-            </a:r>
-            <a:r>
-              <a:rPr lang="es-ES" sz="2800" dirty="0" err="1"/>
-              <a:t>Tomcat</a:t>
-            </a:r>
-            <a:r>
-              <a:rPr lang="es-ES" sz="2800" dirty="0"/>
-              <a:t> 6.0</a:t>
-            </a:r>
-            <a:r>
-              <a:rPr lang="es-ES" sz="2800" b="1" dirty="0"/>
-              <a:t> </a:t>
-            </a:r>
-            <a:endParaRPr lang="en-US" sz="2800" dirty="0"/>
-          </a:p>
-          <a:p>
-            <a:pPr lvl="0"/>
-            <a:r>
-              <a:rPr lang="es-ES" sz="2800" b="1" dirty="0"/>
-              <a:t>Base de Datos: </a:t>
-            </a:r>
-            <a:r>
-              <a:rPr lang="es-ES" sz="2800" dirty="0" err="1"/>
-              <a:t>MySQL</a:t>
-            </a:r>
-            <a:r>
-              <a:rPr lang="es-ES" sz="2800" b="1" dirty="0"/>
-              <a:t> </a:t>
-            </a:r>
-            <a:endParaRPr lang="en-US" sz="2800" dirty="0"/>
+            <a:endParaRPr lang="en-US"/>
           </a:p>
         </p:txBody>
       </p:sp>
@@ -7147,10 +4337,14 @@
           <a:lstStyle/>
           <a:p>
             <a:r>
-              <a:rPr lang="es-ES" dirty="0" smtClean="0"/>
-              <a:t>Estado actual</a:t>
-            </a:r>
-            <a:endParaRPr lang="en-US" dirty="0"/>
+              <a:rPr lang="es-AR" smtClean="0"/>
+              <a:t>Estado </a:t>
+            </a:r>
+            <a:r>
+              <a:rPr lang="es-AR" smtClean="0"/>
+              <a:t>actual</a:t>
+            </a:r>
+            <a:endParaRPr lang="es-AR"/>
           </a:p>
         </p:txBody>
       </p:sp>
@@ -7164,12 +4358,81 @@
             <p:ph idx="1"/>
           </p:nvPr>
         </p:nvSpPr>
-        <p:spPr/>
+        <p:spPr>
+          <a:xfrm>
+            <a:off x="539750" y="1524001"/>
+            <a:ext cx="7993063" cy="4929188"/>
+          </a:xfrm>
+        </p:spPr>
         <p:txBody>
           <a:bodyPr/>
           <a:lstStyle/>
           <a:p>
-            <a:endParaRPr lang="en-US" dirty="0"/>
+            <a:r>
+              <a:rPr lang="es-AR" smtClean="0"/>
+              <a:t>Avance</a:t>
+            </a:r>
+            <a:r>
+              <a:rPr lang="es-AR" smtClean="0"/>
+              <a:t> del </a:t>
+            </a:r>
+            <a:r>
+              <a:rPr lang="es-AR" smtClean="0"/>
+              <a:t>Proyecto:</a:t>
+            </a:r>
+            <a:endParaRPr lang="es-AR" smtClean="0"/>
+          </a:p>
+          <a:p>
+            <a:pPr lvl="1"/>
+            <a:r>
+              <a:rPr lang="es-AR" smtClean="0"/>
+              <a:t>Arquitectura general </a:t>
+            </a:r>
+            <a:r>
+              <a:rPr lang="es-AR" smtClean="0"/>
+              <a:t>SPRING</a:t>
+            </a:r>
+            <a:endParaRPr lang="es-AR" smtClean="0"/>
+          </a:p>
+          <a:p>
+            <a:pPr lvl="1"/>
+            <a:r>
+              <a:rPr lang="es-AR" smtClean="0"/>
+              <a:t>Pruebas de concepto de </a:t>
+            </a:r>
+            <a:r>
+              <a:rPr lang="es-AR" smtClean="0"/>
+              <a:t>GWT</a:t>
+            </a:r>
+            <a:endParaRPr lang="es-AR" smtClean="0"/>
+          </a:p>
+          <a:p>
+            <a:pPr lvl="1"/>
+            <a:r>
+              <a:rPr lang="es-AR" smtClean="0"/>
+              <a:t>Analisis e Desarrollo de </a:t>
+            </a:r>
+            <a:r>
+              <a:rPr lang="es-AR" smtClean="0"/>
+              <a:t>BBDD.</a:t>
+            </a:r>
+            <a:endParaRPr lang="es-AR" smtClean="0"/>
+          </a:p>
+          <a:p>
+            <a:pPr lvl="1"/>
+            <a:r>
+              <a:rPr lang="es-AR" smtClean="0"/>
+              <a:t>Preparación de capa de acceso a </a:t>
+            </a:r>
+            <a:r>
+              <a:rPr lang="es-AR" smtClean="0"/>
+              <a:t>datos.</a:t>
+            </a:r>
+            <a:endParaRPr lang="es-AR" smtClean="0"/>
+          </a:p>
+          <a:p>
+            <a:pPr lvl="1"/>
+            <a:endParaRPr lang="es-AR"/>
           </a:p>
         </p:txBody>
       </p:sp>
@@ -7238,6 +4501,13 @@
           <a:p>
             <a:r>
               <a:rPr lang="es-ES" dirty="0" smtClean="0"/>
+              <a:t>Tutor: </a:t>
+            </a:r>
+          </a:p>
+          <a:p>
+            <a:pPr lvl="1"/>
+            <a:r>
+              <a:rPr lang="es-ES" dirty="0" smtClean="0"/>
               <a:t>Guillermo </a:t>
             </a:r>
             <a:r>
@@ -7255,21 +4525,47 @@
           <a:p>
             <a:r>
               <a:rPr lang="es-ES" dirty="0" smtClean="0"/>
-              <a:t>Juan Pablo Gigante</a:t>
-            </a:r>
-          </a:p>
-          <a:p>
+              <a:t>Equipo:</a:t>
+            </a:r>
+          </a:p>
+          <a:p>
+            <a:pPr lvl="1"/>
             <a:r>
               <a:rPr lang="es-ES" dirty="0" smtClean="0"/>
-              <a:t>Nicolás García</a:t>
-            </a:r>
-          </a:p>
-          <a:p>
+              <a:t>Juan </a:t>
+            </a:r>
             <a:r>
               <a:rPr lang="es-ES" dirty="0" smtClean="0"/>
-              <a:t>Ludmila Rinaudo</a:t>
-            </a:r>
-            <a:endParaRPr lang="en-US" dirty="0"/>
+              <a:t>Pablo Gigante</a:t>
+            </a:r>
+          </a:p>
+          <a:p>
+            <a:pPr lvl="1"/>
+            <a:r>
+              <a:rPr lang="es-ES" dirty="0" err="1" smtClean="0"/>
+              <a:t>Ludmila</a:t>
+            </a:r>
+            <a:r>
+              <a:rPr lang="es-ES" dirty="0" smtClean="0"/>
+              <a:t> </a:t>
+            </a:r>
+            <a:r>
+              <a:rPr lang="es-ES" dirty="0" err="1" smtClean="0"/>
+              <a:t>Rinaudo</a:t>
+            </a:r>
+            <a:endParaRPr lang="es-ES" dirty="0" smtClean="0"/>
+          </a:p>
+          <a:p>
+            <a:pPr lvl="1"/>
+            <a:r>
+              <a:rPr lang="es-ES" dirty="0" smtClean="0"/>
+              <a:t>Nicolás </a:t>
+            </a:r>
+            <a:r>
+              <a:rPr lang="es-ES" dirty="0" smtClean="0"/>
+              <a:t>García</a:t>
+            </a:r>
+            <a:endParaRPr lang="es-ES" dirty="0" smtClean="0"/>
           </a:p>
         </p:txBody>
       </p:sp>
@@ -7314,10 +4610,10 @@
           <a:lstStyle/>
           <a:p>
             <a:r>
-              <a:rPr lang="es-ES" dirty="0" smtClean="0"/>
-              <a:t>Problema actual</a:t>
-            </a:r>
-            <a:endParaRPr lang="en-US" dirty="0"/>
+              <a:rPr lang="es-AR" dirty="0" smtClean="0"/>
+              <a:t>Idea	</a:t>
+            </a:r>
+            <a:endParaRPr lang="es-AR" dirty="0"/>
           </a:p>
         </p:txBody>
       </p:sp>
@@ -7328,7 +4624,7 @@
             <a:spLocks noGrp="1"/>
           </p:cNvSpPr>
           <p:nvPr>
-            <p:ph sz="half" idx="1"/>
+            <p:ph idx="1"/>
           </p:nvPr>
         </p:nvSpPr>
         <p:spPr/>
@@ -7336,67 +4632,18 @@
           <a:bodyPr/>
           <a:lstStyle/>
           <a:p>
-            <a:endParaRPr lang="es-ES" dirty="0" smtClean="0"/>
-          </a:p>
-          <a:p>
-            <a:endParaRPr lang="es-ES" dirty="0"/>
-          </a:p>
-          <a:p>
-            <a:r>
-              <a:rPr lang="es-ES" dirty="0" smtClean="0"/>
-              <a:t>Herramientas </a:t>
+            <a:r>
+              <a:rPr lang="es-AR" dirty="0" smtClean="0"/>
+              <a:t>Gestor de horas.</a:t>
             </a:r>
           </a:p>
           <a:p>
             <a:pPr lvl="1"/>
             <a:r>
-              <a:rPr lang="es-ES" dirty="0" smtClean="0"/>
-              <a:t>Poco eficientes</a:t>
-            </a:r>
-          </a:p>
-          <a:p>
-            <a:pPr lvl="1"/>
-            <a:r>
-              <a:rPr lang="es-ES" dirty="0" smtClean="0"/>
-              <a:t>Difíciles de utilizar</a:t>
-            </a:r>
-          </a:p>
-        </p:txBody>
-      </p:sp>
-      <p:sp>
-        <p:nvSpPr>
-          <p:cNvPr id="4" name="Content Placeholder 3"/>
-          <p:cNvSpPr>
-            <a:spLocks noGrp="1"/>
-          </p:cNvSpPr>
-          <p:nvPr>
-            <p:ph sz="half" idx="2"/>
-          </p:nvPr>
-        </p:nvSpPr>
-        <p:spPr>
-          <a:xfrm>
-            <a:off x="5257800" y="1700213"/>
-            <a:ext cx="3465512" cy="4752975"/>
-          </a:xfrm>
-        </p:spPr>
-        <p:txBody>
-          <a:bodyPr/>
-          <a:lstStyle/>
-          <a:p>
-            <a:endParaRPr lang="es-ES" dirty="0" smtClean="0"/>
-          </a:p>
-          <a:p>
-            <a:endParaRPr lang="es-ES" dirty="0"/>
-          </a:p>
-          <a:p>
-            <a:r>
-              <a:rPr lang="es-ES" dirty="0" smtClean="0"/>
-              <a:t>Las métricas obtenidas no son útiles</a:t>
-            </a:r>
-            <a:endParaRPr lang="en-US" dirty="0" smtClean="0"/>
-          </a:p>
-          <a:p>
-            <a:endParaRPr lang="en-US" dirty="0"/>
+              <a:rPr lang="es-AR" dirty="0" smtClean="0"/>
+              <a:t>La idea original nace de los problemas </a:t>
+            </a:r>
+            <a:endParaRPr lang="es-AR" dirty="0"/>
           </a:p>
         </p:txBody>
       </p:sp>
@@ -7442,7 +4689,7 @@
           <a:p>
             <a:r>
               <a:rPr lang="es-ES" dirty="0" smtClean="0"/>
-              <a:t>Solución</a:t>
+              <a:t>Problema actual</a:t>
             </a:r>
             <a:endParaRPr lang="en-US" dirty="0"/>
           </a:p>
@@ -7455,45 +4702,97 @@
             <a:spLocks noGrp="1"/>
           </p:cNvSpPr>
           <p:nvPr>
-            <p:ph idx="1"/>
-          </p:nvPr>
-        </p:nvSpPr>
-        <p:spPr/>
+            <p:ph sz="half" idx="1"/>
+          </p:nvPr>
+        </p:nvSpPr>
+        <p:spPr>
+          <a:xfrm>
+            <a:off x="539750" y="1700213"/>
+            <a:ext cx="8223250" cy="4752975"/>
+          </a:xfrm>
+        </p:spPr>
         <p:txBody>
           <a:bodyPr/>
           <a:lstStyle/>
           <a:p>
             <a:r>
               <a:rPr lang="es-ES" dirty="0" smtClean="0"/>
-              <a:t>Sistema </a:t>
-            </a:r>
+              <a:t>Herramientas existentes</a:t>
+            </a:r>
+            <a:endParaRPr lang="es-ES" dirty="0" smtClean="0"/>
           </a:p>
           <a:p>
             <a:pPr lvl="1"/>
             <a:r>
               <a:rPr lang="es-ES" dirty="0" smtClean="0"/>
-              <a:t>Que permita el control eficiente de los tiempos dedicados a las tareas de proyectos</a:t>
+              <a:t>Poco eficientes</a:t>
             </a:r>
           </a:p>
           <a:p>
             <a:pPr lvl="1"/>
             <a:r>
               <a:rPr lang="es-ES" dirty="0" smtClean="0"/>
-              <a:t>Sencillo</a:t>
+              <a:t>Difíciles </a:t>
+            </a:r>
+            <a:r>
+              <a:rPr lang="es-ES" dirty="0" smtClean="0"/>
+              <a:t>de </a:t>
+            </a:r>
+            <a:r>
+              <a:rPr lang="es-ES" dirty="0" smtClean="0"/>
+              <a:t>utilizar</a:t>
             </a:r>
           </a:p>
           <a:p>
             <a:pPr lvl="1"/>
             <a:r>
               <a:rPr lang="es-ES" dirty="0" smtClean="0"/>
-              <a:t>Interfaces amigables</a:t>
-            </a:r>
+              <a:t>Demasiado básicas</a:t>
+            </a:r>
+          </a:p>
+          <a:p>
+            <a:pPr lvl="1"/>
+            <a:endParaRPr lang="es-ES" dirty="0" smtClean="0"/>
           </a:p>
           <a:p>
             <a:r>
               <a:rPr lang="es-ES" dirty="0" smtClean="0"/>
-              <a:t>Brindar flexibilidad e información útil</a:t>
-            </a:r>
+              <a:t>Las métricas obtenidas no son útiles</a:t>
+            </a:r>
+            <a:endParaRPr lang="en-US" dirty="0" smtClean="0"/>
+          </a:p>
+          <a:p>
+            <a:pPr>
+              <a:buNone/>
+            </a:pPr>
+            <a:endParaRPr lang="es-ES" dirty="0" smtClean="0"/>
+          </a:p>
+        </p:txBody>
+      </p:sp>
+      <p:sp>
+        <p:nvSpPr>
+          <p:cNvPr id="4" name="Content Placeholder 3"/>
+          <p:cNvSpPr>
+            <a:spLocks noGrp="1"/>
+          </p:cNvSpPr>
+          <p:nvPr>
+            <p:ph sz="half" idx="2"/>
+          </p:nvPr>
+        </p:nvSpPr>
+        <p:spPr>
+          <a:xfrm>
+            <a:off x="5257800" y="1700213"/>
+            <a:ext cx="3465512" cy="4752975"/>
+          </a:xfrm>
+        </p:spPr>
+        <p:txBody>
+          <a:bodyPr/>
+          <a:lstStyle/>
+          <a:p>
+            <a:endParaRPr lang="es-ES" dirty="0" smtClean="0"/>
+          </a:p>
+          <a:p>
+            <a:endParaRPr lang="es-ES" dirty="0"/>
           </a:p>
           <a:p>
             <a:endParaRPr lang="en-US" dirty="0"/>
@@ -7542,7 +4841,7 @@
           <a:p>
             <a:r>
               <a:rPr lang="es-ES" dirty="0" smtClean="0"/>
-              <a:t>Ventajas</a:t>
+              <a:t>Solución</a:t>
             </a:r>
             <a:endParaRPr lang="en-US" dirty="0"/>
           </a:p>
@@ -7558,129 +4857,51 @@
             <p:ph idx="1"/>
           </p:nvPr>
         </p:nvSpPr>
-        <p:spPr>
-          <a:xfrm>
-            <a:off x="539750" y="1524000"/>
-            <a:ext cx="8451850" cy="4752975"/>
-          </a:xfrm>
-        </p:spPr>
+        <p:spPr/>
         <p:txBody>
           <a:bodyPr/>
           <a:lstStyle/>
           <a:p>
-            <a:pPr lvl="0"/>
-            <a:r>
-              <a:rPr lang="es-ES" sz="2800" dirty="0" smtClean="0"/>
-              <a:t>Carga </a:t>
-            </a:r>
-            <a:r>
-              <a:rPr lang="es-ES" sz="2800" dirty="0"/>
-              <a:t>de horas de una manera simple </a:t>
-            </a:r>
-            <a:endParaRPr lang="es-ES" sz="2800" dirty="0" smtClean="0"/>
-          </a:p>
-          <a:p>
-            <a:pPr lvl="0"/>
-            <a:r>
-              <a:rPr lang="es-ES" sz="2800" dirty="0" smtClean="0"/>
-              <a:t>Mostrar horas </a:t>
-            </a:r>
-            <a:r>
-              <a:rPr lang="es-ES" sz="2800" dirty="0"/>
-              <a:t>reales consumidas por cada tarea.</a:t>
-            </a:r>
-            <a:endParaRPr lang="en-US" sz="2800" dirty="0"/>
-          </a:p>
-          <a:p>
-            <a:pPr lvl="0"/>
-            <a:r>
-              <a:rPr lang="es-ES" sz="2800" dirty="0" smtClean="0"/>
-              <a:t>Ordenar </a:t>
-            </a:r>
-            <a:r>
-              <a:rPr lang="es-ES" sz="2800" dirty="0"/>
-              <a:t>el trabajo asignado a un </a:t>
-            </a:r>
-            <a:r>
-              <a:rPr lang="es-ES" sz="2800" dirty="0" smtClean="0"/>
-              <a:t>recurso</a:t>
-            </a:r>
-            <a:endParaRPr lang="en-US" sz="2800" dirty="0"/>
-          </a:p>
-          <a:p>
-            <a:pPr lvl="0"/>
-            <a:r>
-              <a:rPr lang="es-ES" sz="2800" dirty="0" smtClean="0"/>
-              <a:t>Distinguir </a:t>
-            </a:r>
-            <a:r>
-              <a:rPr lang="es-ES" sz="2800" dirty="0"/>
-              <a:t>horas de diferentes </a:t>
-            </a:r>
-            <a:r>
-              <a:rPr lang="es-ES" sz="2800" dirty="0" smtClean="0"/>
-              <a:t>proyectos</a:t>
-            </a:r>
-            <a:endParaRPr lang="en-US" sz="2800" dirty="0"/>
-          </a:p>
-          <a:p>
-            <a:pPr lvl="0"/>
-            <a:r>
-              <a:rPr lang="es-ES" sz="2800" dirty="0" smtClean="0"/>
-              <a:t>Control </a:t>
-            </a:r>
-            <a:r>
-              <a:rPr lang="es-ES" sz="2800" dirty="0"/>
-              <a:t>de horas independientemente de la metodología </a:t>
-            </a:r>
-            <a:r>
-              <a:rPr lang="es-ES" sz="2800" dirty="0" smtClean="0"/>
-              <a:t>utilizada</a:t>
-            </a:r>
-            <a:endParaRPr lang="en-US" sz="2800" dirty="0"/>
-          </a:p>
-          <a:p>
-            <a:pPr lvl="0"/>
-            <a:r>
-              <a:rPr lang="es-ES" sz="2800" dirty="0" smtClean="0"/>
-              <a:t>Controlar </a:t>
-            </a:r>
-            <a:r>
-              <a:rPr lang="es-ES" sz="2800" dirty="0"/>
-              <a:t>el Esfuerzo </a:t>
-            </a:r>
-            <a:r>
-              <a:rPr lang="es-ES" sz="2800" dirty="0" smtClean="0"/>
-              <a:t>y </a:t>
-            </a:r>
-            <a:r>
-              <a:rPr lang="es-ES" sz="2800" dirty="0"/>
-              <a:t>la </a:t>
-            </a:r>
-            <a:r>
-              <a:rPr lang="es-ES" sz="2800" dirty="0" smtClean="0"/>
-              <a:t>Duración</a:t>
-            </a:r>
-            <a:endParaRPr lang="en-US" sz="2800" dirty="0"/>
-          </a:p>
-          <a:p>
-            <a:pPr lvl="0"/>
-            <a:r>
-              <a:rPr lang="es-ES" sz="2800" dirty="0" smtClean="0"/>
-              <a:t>Control </a:t>
-            </a:r>
-            <a:r>
-              <a:rPr lang="es-ES" sz="2800" dirty="0"/>
-              <a:t>del </a:t>
-            </a:r>
-            <a:r>
-              <a:rPr lang="es-ES" sz="2800" dirty="0" smtClean="0"/>
-              <a:t>presupuesto</a:t>
-            </a:r>
-            <a:endParaRPr lang="en-US" sz="2800" dirty="0"/>
-          </a:p>
-          <a:p>
-            <a:endParaRPr lang="en-US" sz="2800" dirty="0"/>
+            <a:r>
+              <a:rPr lang="es-ES" dirty="0" smtClean="0"/>
+              <a:t>Sistema </a:t>
+            </a:r>
+          </a:p>
+          <a:p>
+            <a:pPr lvl="1"/>
+            <a:r>
+              <a:rPr lang="es-ES" dirty="0" smtClean="0"/>
+              <a:t>Que permita el control eficiente de los tiempos dedicados a las tareas de proyectos</a:t>
+            </a:r>
+          </a:p>
+          <a:p>
+            <a:pPr lvl="1"/>
+            <a:r>
+              <a:rPr lang="es-ES" dirty="0" smtClean="0"/>
+              <a:t>Sencillo de administrar y utilizar.</a:t>
+            </a:r>
+            <a:endParaRPr lang="es-ES" dirty="0" smtClean="0"/>
+          </a:p>
+          <a:p>
+            <a:pPr lvl="1"/>
+            <a:r>
+              <a:rPr lang="es-ES" dirty="0" smtClean="0"/>
+              <a:t>Interfaces </a:t>
+            </a:r>
+            <a:r>
+              <a:rPr lang="es-ES" dirty="0" smtClean="0"/>
+              <a:t>amigables.</a:t>
+            </a:r>
+            <a:endParaRPr lang="es-ES" dirty="0" smtClean="0"/>
+          </a:p>
+          <a:p>
+            <a:r>
+              <a:rPr lang="es-ES" dirty="0" smtClean="0"/>
+              <a:t>Brindar flexibilidad e información útil</a:t>
+            </a:r>
+          </a:p>
+          <a:p>
+            <a:endParaRPr lang="en-US" dirty="0"/>
           </a:p>
         </p:txBody>
       </p:sp>
@@ -7726,7 +4947,7 @@
           <a:p>
             <a:r>
               <a:rPr lang="es-ES" dirty="0" smtClean="0"/>
-              <a:t>Funciones del Sistema</a:t>
+              <a:t>Objetivos del Sistema</a:t>
             </a:r>
             <a:endParaRPr lang="en-US" dirty="0"/>
           </a:p>
@@ -7744,118 +4965,126 @@
         </p:nvSpPr>
         <p:spPr>
           <a:xfrm>
-            <a:off x="539750" y="1524000"/>
-            <a:ext cx="7993063" cy="5105400"/>
+            <a:off x="539750" y="1600200"/>
+            <a:ext cx="8451850" cy="4676775"/>
           </a:xfrm>
         </p:spPr>
         <p:txBody>
           <a:bodyPr/>
           <a:lstStyle/>
           <a:p>
-            <a:r>
-              <a:rPr lang="es-ES" sz="2800" dirty="0"/>
-              <a:t>Carga de </a:t>
-            </a:r>
-            <a:r>
-              <a:rPr lang="es-ES" sz="2800" dirty="0" smtClean="0"/>
-              <a:t>horas (Chat, web, mail)</a:t>
-            </a:r>
-            <a:endParaRPr lang="es-ES" sz="2800" dirty="0"/>
-          </a:p>
-          <a:p>
+            <a:pPr lvl="0"/>
             <a:r>
               <a:rPr lang="es-ES" sz="2800" dirty="0" smtClean="0"/>
               <a:t>Carga </a:t>
             </a:r>
             <a:r>
               <a:rPr lang="es-ES" sz="2800" dirty="0"/>
-              <a:t>de </a:t>
-            </a:r>
+              <a:t>de horas de una manera simple </a:t>
+            </a:r>
+            <a:endParaRPr lang="es-ES" sz="2800" dirty="0" smtClean="0"/>
+          </a:p>
+          <a:p>
+            <a:pPr lvl="0"/>
             <a:r>
               <a:rPr lang="es-ES" sz="2800" dirty="0" smtClean="0"/>
-              <a:t>personas</a:t>
-            </a:r>
-          </a:p>
-          <a:p>
+              <a:t>Mostrar horas </a:t>
+            </a:r>
             <a:r>
               <a:rPr lang="es-ES" sz="2800" dirty="0"/>
-              <a:t>Creación de </a:t>
-            </a:r>
+              <a:t>reales consumidas por cada tarea.</a:t>
+            </a:r>
+            <a:endParaRPr lang="en-US" sz="2800" dirty="0"/>
+          </a:p>
+          <a:p>
+            <a:pPr lvl="0"/>
             <a:r>
               <a:rPr lang="es-ES" sz="2800" dirty="0" smtClean="0"/>
-              <a:t>clientes</a:t>
-            </a:r>
-          </a:p>
-          <a:p>
+              <a:t>Ordenar </a:t>
+            </a:r>
             <a:r>
               <a:rPr lang="es-ES" sz="2800" dirty="0"/>
-              <a:t>Creación de </a:t>
+              <a:t>el trabajo asignado a un </a:t>
+            </a:r>
+            <a:r>
+              <a:rPr lang="es-ES" sz="2800" dirty="0" smtClean="0"/>
+              <a:t>recurso</a:t>
+            </a:r>
+            <a:endParaRPr lang="en-US" sz="2800" dirty="0"/>
+          </a:p>
+          <a:p>
+            <a:pPr lvl="0"/>
+            <a:r>
+              <a:rPr lang="es-ES" sz="2800" dirty="0" smtClean="0"/>
+              <a:t>Distinguir </a:t>
+            </a:r>
+            <a:r>
+              <a:rPr lang="es-ES" sz="2800" dirty="0"/>
+              <a:t>horas de diferentes </a:t>
             </a:r>
             <a:r>
               <a:rPr lang="es-ES" sz="2800" dirty="0" smtClean="0"/>
               <a:t>proyectos</a:t>
             </a:r>
-          </a:p>
-          <a:p>
+            <a:endParaRPr lang="en-US" sz="2800" dirty="0"/>
+          </a:p>
+          <a:p>
+            <a:pPr lvl="0"/>
+            <a:r>
+              <a:rPr lang="es-ES" sz="2800" dirty="0" smtClean="0"/>
+              <a:t>Control </a:t>
+            </a:r>
             <a:r>
               <a:rPr lang="es-ES" sz="2800" dirty="0"/>
-              <a:t>Creación de tareas y asignación de </a:t>
+              <a:t>de horas independientemente de la metodología </a:t>
             </a:r>
             <a:r>
               <a:rPr lang="es-ES" sz="2800" dirty="0" smtClean="0"/>
-              <a:t>personas</a:t>
-            </a:r>
-          </a:p>
-          <a:p>
+              <a:t>utilizada</a:t>
+            </a:r>
+            <a:endParaRPr lang="en-US" sz="2800" dirty="0"/>
+          </a:p>
+          <a:p>
+            <a:pPr lvl="0"/>
+            <a:r>
+              <a:rPr lang="es-ES" sz="2800" dirty="0" smtClean="0"/>
+              <a:t>Controlar </a:t>
+            </a:r>
             <a:r>
               <a:rPr lang="es-ES" sz="2800" dirty="0"/>
-              <a:t>Carga de días/horas por </a:t>
+              <a:t>el Esfuerzo </a:t>
             </a:r>
             <a:r>
               <a:rPr lang="es-ES" sz="2800" dirty="0" smtClean="0"/>
-              <a:t>ausencias</a:t>
-            </a:r>
-          </a:p>
-          <a:p>
+              <a:t>y </a:t>
+            </a:r>
             <a:r>
               <a:rPr lang="es-ES" sz="2800" dirty="0"/>
-              <a:t>Reportes y </a:t>
+              <a:t>la </a:t>
             </a:r>
             <a:r>
               <a:rPr lang="es-ES" sz="2800" dirty="0" smtClean="0"/>
-              <a:t>estadísticas</a:t>
-            </a:r>
-          </a:p>
-          <a:p>
+              <a:t>Duración</a:t>
+            </a:r>
+            <a:endParaRPr lang="en-US" sz="2800" dirty="0"/>
+          </a:p>
+          <a:p>
+            <a:pPr lvl="0"/>
+            <a:r>
+              <a:rPr lang="es-ES" sz="2800" dirty="0" smtClean="0"/>
+              <a:t>Control </a:t>
+            </a:r>
             <a:r>
               <a:rPr lang="es-ES" sz="2800" dirty="0"/>
-              <a:t>Validación de horas </a:t>
+              <a:t>del </a:t>
             </a:r>
             <a:r>
               <a:rPr lang="es-ES" sz="2800" dirty="0" smtClean="0"/>
-              <a:t>cargadas</a:t>
-            </a:r>
-          </a:p>
-          <a:p>
-            <a:r>
-              <a:rPr lang="es-ES" sz="2800" dirty="0"/>
-              <a:t>Detección de horas </a:t>
-            </a:r>
-            <a:r>
-              <a:rPr lang="es-ES" sz="2800" dirty="0" smtClean="0"/>
-              <a:t>extras</a:t>
-            </a:r>
-          </a:p>
-          <a:p>
-            <a:pPr lvl="0"/>
-            <a:r>
-              <a:rPr lang="es-ES" sz="2800" dirty="0"/>
-              <a:t>Asignación de un valor monetario a las </a:t>
-            </a:r>
-            <a:r>
-              <a:rPr lang="es-ES" sz="2800" dirty="0" smtClean="0"/>
-              <a:t>horas</a:t>
-            </a:r>
+              <a:t>presupuesto (opcional)</a:t>
+            </a:r>
+            <a:endParaRPr lang="en-US" sz="2800" dirty="0"/>
+          </a:p>
+          <a:p>
             <a:endParaRPr lang="en-US" sz="2800" dirty="0"/>
           </a:p>
         </p:txBody>
@@ -7869,6 +5098,214 @@
 </file>
 
 <file path=ppt/slides/slide7.xml><?xml version="1.0" encoding="utf-8"?>
+<p:sld xmlns:a="http://schemas.openxmlformats.org/drawingml/2006/main" xmlns:r="http://schemas.openxmlformats.org/officeDocument/2006/relationships" xmlns:p="http://schemas.openxmlformats.org/presentationml/2006/main">
+  <p:cSld>
+    <p:spTree>
+      <p:nvGrpSpPr>
+        <p:cNvPr id="1" name=""/>
+        <p:cNvGrpSpPr/>
+        <p:nvPr/>
+      </p:nvGrpSpPr>
+      <p:grpSpPr>
+        <a:xfrm>
+          <a:off x="0" y="0"/>
+          <a:ext cx="0" cy="0"/>
+          <a:chOff x="0" y="0"/>
+          <a:chExt cx="0" cy="0"/>
+        </a:xfrm>
+      </p:grpSpPr>
+      <p:sp>
+        <p:nvSpPr>
+          <p:cNvPr id="2" name="Title 1"/>
+          <p:cNvSpPr>
+            <a:spLocks noGrp="1"/>
+          </p:cNvSpPr>
+          <p:nvPr>
+            <p:ph type="title"/>
+          </p:nvPr>
+        </p:nvSpPr>
+        <p:spPr/>
+        <p:txBody>
+          <a:bodyPr/>
+          <a:lstStyle/>
+          <a:p>
+            <a:r>
+              <a:rPr lang="es-AR" smtClean="0"/>
+              <a:t>Funciones </a:t>
+            </a:r>
+            <a:r>
+              <a:rPr lang="es-AR" smtClean="0"/>
+              <a:t>del </a:t>
+            </a:r>
+            <a:r>
+              <a:rPr lang="es-AR" smtClean="0"/>
+              <a:t>Sistema</a:t>
+            </a:r>
+            <a:endParaRPr lang="es-AR"/>
+          </a:p>
+        </p:txBody>
+      </p:sp>
+      <p:sp>
+        <p:nvSpPr>
+          <p:cNvPr id="3" name="Content Placeholder 2"/>
+          <p:cNvSpPr>
+            <a:spLocks noGrp="1"/>
+          </p:cNvSpPr>
+          <p:nvPr>
+            <p:ph idx="1"/>
+          </p:nvPr>
+        </p:nvSpPr>
+        <p:spPr>
+          <a:xfrm>
+            <a:off x="539750" y="1524000"/>
+            <a:ext cx="7993063" cy="5105400"/>
+          </a:xfrm>
+        </p:spPr>
+        <p:txBody>
+          <a:bodyPr/>
+          <a:lstStyle/>
+          <a:p>
+            <a:r>
+              <a:rPr lang="es-AR" sz="2800" smtClean="0"/>
+              <a:t>Carga </a:t>
+            </a:r>
+            <a:r>
+              <a:rPr lang="es-AR" sz="2800" smtClean="0"/>
+              <a:t>de horas </a:t>
+            </a:r>
+            <a:r>
+              <a:rPr lang="es-AR" sz="2800" smtClean="0"/>
+              <a:t>(Chat</a:t>
+            </a:r>
+            <a:r>
+              <a:rPr lang="es-AR" sz="2800" smtClean="0"/>
+              <a:t>, </a:t>
+            </a:r>
+            <a:r>
+              <a:rPr lang="es-AR" sz="2800" smtClean="0"/>
+              <a:t>web</a:t>
+            </a:r>
+            <a:r>
+              <a:rPr lang="es-AR" sz="2800" smtClean="0"/>
+              <a:t>, </a:t>
+            </a:r>
+            <a:r>
+              <a:rPr lang="es-AR" sz="2800" smtClean="0"/>
+              <a:t>mail)</a:t>
+            </a:r>
+            <a:endParaRPr lang="es-AR" sz="2800" smtClean="0"/>
+          </a:p>
+          <a:p>
+            <a:r>
+              <a:rPr lang="es-AR" sz="2800" smtClean="0"/>
+              <a:t>Carga de </a:t>
+            </a:r>
+            <a:r>
+              <a:rPr lang="es-AR" sz="2800" smtClean="0"/>
+              <a:t>personas</a:t>
+            </a:r>
+            <a:endParaRPr lang="es-AR" sz="2800" smtClean="0"/>
+          </a:p>
+          <a:p>
+            <a:r>
+              <a:rPr lang="es-AR" sz="2800" smtClean="0"/>
+              <a:t>Creación de </a:t>
+            </a:r>
+            <a:r>
+              <a:rPr lang="es-AR" sz="2800" smtClean="0"/>
+              <a:t>clientes</a:t>
+            </a:r>
+            <a:endParaRPr lang="es-AR" sz="2800" smtClean="0"/>
+          </a:p>
+          <a:p>
+            <a:r>
+              <a:rPr lang="es-AR" sz="2800" smtClean="0"/>
+              <a:t>Creación de </a:t>
+            </a:r>
+            <a:r>
+              <a:rPr lang="es-AR" sz="2800" smtClean="0"/>
+              <a:t>proyectos</a:t>
+            </a:r>
+            <a:endParaRPr lang="es-AR" sz="2800" smtClean="0"/>
+          </a:p>
+          <a:p>
+            <a:r>
+              <a:rPr lang="es-AR" sz="2800" smtClean="0"/>
+              <a:t>Creación de tareas y asignación de </a:t>
+            </a:r>
+            <a:r>
+              <a:rPr lang="es-AR" sz="2800" smtClean="0"/>
+              <a:t>personas</a:t>
+            </a:r>
+            <a:endParaRPr lang="es-AR" sz="2800" smtClean="0"/>
+          </a:p>
+          <a:p>
+            <a:r>
+              <a:rPr lang="es-AR" sz="2800" smtClean="0"/>
+              <a:t>Carga de días/horas por </a:t>
+            </a:r>
+            <a:r>
+              <a:rPr lang="es-AR" sz="2800" smtClean="0"/>
+              <a:t>ausencias</a:t>
+            </a:r>
+            <a:endParaRPr lang="es-AR" sz="2800" smtClean="0"/>
+          </a:p>
+          <a:p>
+            <a:r>
+              <a:rPr lang="es-AR" sz="2800" smtClean="0"/>
+              <a:t>Reportes y </a:t>
+            </a:r>
+            <a:r>
+              <a:rPr lang="es-AR" sz="2800" smtClean="0"/>
+              <a:t>estadísticas</a:t>
+            </a:r>
+            <a:endParaRPr lang="es-AR" sz="2800" smtClean="0"/>
+          </a:p>
+          <a:p>
+            <a:r>
+              <a:rPr lang="es-AR" sz="2800" smtClean="0"/>
+              <a:t>Validación de horas </a:t>
+            </a:r>
+            <a:r>
+              <a:rPr lang="es-AR" sz="2800" smtClean="0"/>
+              <a:t>cargadas</a:t>
+            </a:r>
+            <a:endParaRPr lang="es-AR" sz="2800" smtClean="0"/>
+          </a:p>
+          <a:p>
+            <a:r>
+              <a:rPr lang="es-AR" sz="2800" smtClean="0"/>
+              <a:t>Detección de horas </a:t>
+            </a:r>
+            <a:r>
+              <a:rPr lang="es-AR" sz="2800" smtClean="0"/>
+              <a:t>extras</a:t>
+            </a:r>
+            <a:endParaRPr lang="es-AR" sz="2800" smtClean="0"/>
+          </a:p>
+          <a:p>
+            <a:pPr lvl="0"/>
+            <a:r>
+              <a:rPr lang="es-AR" sz="2800" smtClean="0"/>
+              <a:t>Asignación de un valor monetario a las </a:t>
+            </a:r>
+            <a:r>
+              <a:rPr lang="es-AR" sz="2800" smtClean="0"/>
+              <a:t>horas</a:t>
+            </a:r>
+            <a:endParaRPr lang="es-AR" sz="2800"/>
+          </a:p>
+        </p:txBody>
+      </p:sp>
+    </p:spTree>
+  </p:cSld>
+  <p:clrMapOvr>
+    <a:masterClrMapping/>
+  </p:clrMapOvr>
+</p:sld>
+</file>
+
+<file path=ppt/slides/slide8.xml><?xml version="1.0" encoding="utf-8"?>
 <p:sld xmlns:a="http://schemas.openxmlformats.org/drawingml/2006/main" xmlns:r="http://schemas.openxmlformats.org/officeDocument/2006/relationships" xmlns:p="http://schemas.openxmlformats.org/presentationml/2006/main">
   <p:cSld>
     <p:spTree>
@@ -7932,202 +5369,6 @@
 </p:sld>
 </file>
 
-<file path=ppt/slides/slide8.xml><?xml version="1.0" encoding="utf-8"?>
-<p:sld xmlns:a="http://schemas.openxmlformats.org/drawingml/2006/main" xmlns:r="http://schemas.openxmlformats.org/officeDocument/2006/relationships" xmlns:p="http://schemas.openxmlformats.org/presentationml/2006/main">
-  <p:cSld>
-    <p:spTree>
-      <p:nvGrpSpPr>
-        <p:cNvPr id="1" name=""/>
-        <p:cNvGrpSpPr/>
-        <p:nvPr/>
-      </p:nvGrpSpPr>
-      <p:grpSpPr>
-        <a:xfrm>
-          <a:off x="0" y="0"/>
-          <a:ext cx="0" cy="0"/>
-          <a:chOff x="0" y="0"/>
-          <a:chExt cx="0" cy="0"/>
-        </a:xfrm>
-      </p:grpSpPr>
-      <p:sp>
-        <p:nvSpPr>
-          <p:cNvPr id="2" name="Title 1"/>
-          <p:cNvSpPr>
-            <a:spLocks noGrp="1"/>
-          </p:cNvSpPr>
-          <p:nvPr>
-            <p:ph type="title"/>
-          </p:nvPr>
-        </p:nvSpPr>
-        <p:spPr/>
-        <p:txBody>
-          <a:bodyPr/>
-          <a:lstStyle/>
-          <a:p>
-            <a:r>
-              <a:rPr lang="es-ES" dirty="0" smtClean="0"/>
-              <a:t>Forma de Trabajo: </a:t>
-            </a:r>
-            <a:r>
-              <a:rPr lang="es-ES" dirty="0" err="1" smtClean="0"/>
-              <a:t>Scrum</a:t>
-            </a:r>
-            <a:endParaRPr lang="en-US" dirty="0"/>
-          </a:p>
-        </p:txBody>
-      </p:sp>
-      <p:sp>
-        <p:nvSpPr>
-          <p:cNvPr id="3" name="Content Placeholder 2"/>
-          <p:cNvSpPr>
-            <a:spLocks noGrp="1"/>
-          </p:cNvSpPr>
-          <p:nvPr>
-            <p:ph idx="1"/>
-          </p:nvPr>
-        </p:nvSpPr>
-        <p:spPr>
-          <a:xfrm>
-            <a:off x="539750" y="1700213"/>
-            <a:ext cx="8451850" cy="4752975"/>
-          </a:xfrm>
-        </p:spPr>
-        <p:txBody>
-          <a:bodyPr/>
-          <a:lstStyle/>
-          <a:p>
-            <a:pPr lvl="0"/>
-            <a:r>
-              <a:rPr lang="es-ES" sz="2800" b="1" dirty="0"/>
-              <a:t>Duración del Sprint</a:t>
-            </a:r>
-            <a:r>
-              <a:rPr lang="es-ES" sz="2800" dirty="0"/>
-              <a:t>: 1 </a:t>
-            </a:r>
-            <a:r>
-              <a:rPr lang="es-ES" sz="2800" dirty="0" smtClean="0"/>
-              <a:t>mes. </a:t>
-            </a:r>
-            <a:endParaRPr lang="en-US" sz="2800" dirty="0"/>
-          </a:p>
-          <a:p>
-            <a:pPr lvl="0"/>
-            <a:r>
-              <a:rPr lang="es-ES" sz="2800" b="1" dirty="0" err="1"/>
-              <a:t>Daily</a:t>
-            </a:r>
-            <a:r>
-              <a:rPr lang="es-ES" sz="2800" b="1" dirty="0"/>
-              <a:t> </a:t>
-            </a:r>
-            <a:r>
-              <a:rPr lang="es-ES" sz="2800" b="1" dirty="0" err="1"/>
-              <a:t>meeting</a:t>
-            </a:r>
-            <a:r>
-              <a:rPr lang="es-ES" sz="2800" dirty="0"/>
-              <a:t>: 2 por semana </a:t>
-            </a:r>
-            <a:endParaRPr lang="en-US" sz="2800" dirty="0"/>
-          </a:p>
-          <a:p>
-            <a:pPr lvl="0"/>
-            <a:r>
-              <a:rPr lang="es-ES" sz="2800" b="1" dirty="0" err="1"/>
-              <a:t>Planning</a:t>
-            </a:r>
-            <a:r>
-              <a:rPr lang="es-ES" sz="2800" b="1" dirty="0"/>
-              <a:t> </a:t>
-            </a:r>
-            <a:r>
-              <a:rPr lang="es-ES" sz="2800" b="1" dirty="0" smtClean="0"/>
-              <a:t>Meeting</a:t>
-            </a:r>
-            <a:r>
-              <a:rPr lang="es-ES" sz="2800" dirty="0" smtClean="0"/>
-              <a:t>: al </a:t>
-            </a:r>
-            <a:r>
-              <a:rPr lang="es-ES" sz="2800" dirty="0"/>
-              <a:t>comienzo de cada iteración para planificar el Sprint. </a:t>
-            </a:r>
-            <a:endParaRPr lang="en-US" sz="2800" dirty="0"/>
-          </a:p>
-          <a:p>
-            <a:pPr lvl="0"/>
-            <a:r>
-              <a:rPr lang="es-ES" sz="2800" b="1" dirty="0"/>
-              <a:t>Sprint </a:t>
-            </a:r>
-            <a:r>
-              <a:rPr lang="es-ES" sz="2800" b="1" dirty="0" err="1"/>
-              <a:t>Retrospective</a:t>
-            </a:r>
-            <a:r>
-              <a:rPr lang="es-ES" sz="2800" dirty="0"/>
-              <a:t>: al finalizar cada Sprint </a:t>
-            </a:r>
-            <a:endParaRPr lang="en-US" sz="2800" dirty="0"/>
-          </a:p>
-          <a:p>
-            <a:pPr lvl="0"/>
-            <a:r>
-              <a:rPr lang="es-ES" sz="2800" b="1" dirty="0"/>
-              <a:t>Comunicación</a:t>
-            </a:r>
-            <a:r>
-              <a:rPr lang="es-ES" sz="2800" dirty="0"/>
-              <a:t>: </a:t>
-            </a:r>
-            <a:r>
-              <a:rPr lang="es-ES" sz="2800" dirty="0" smtClean="0"/>
-              <a:t>comunicación </a:t>
-            </a:r>
-            <a:r>
-              <a:rPr lang="es-ES" sz="2800" dirty="0"/>
-              <a:t>con el tutor será semanal y a través de Ludmila. </a:t>
-            </a:r>
-            <a:r>
-              <a:rPr lang="es-ES" sz="2800" dirty="0" smtClean="0"/>
-              <a:t>El se usa como </a:t>
-            </a:r>
-            <a:r>
-              <a:rPr lang="es-ES" sz="2800" dirty="0"/>
-              <a:t>método de comunicación no </a:t>
-            </a:r>
-            <a:r>
-              <a:rPr lang="es-ES" sz="2800" dirty="0" smtClean="0"/>
-              <a:t>crítica.</a:t>
-            </a:r>
-            <a:endParaRPr lang="en-US" sz="2800" dirty="0"/>
-          </a:p>
-          <a:p>
-            <a:pPr lvl="0"/>
-            <a:r>
-              <a:rPr lang="es-ES" sz="2800" b="1" dirty="0"/>
-              <a:t>Entregas al cliente</a:t>
-            </a:r>
-            <a:r>
-              <a:rPr lang="es-ES" sz="2800" dirty="0"/>
-              <a:t>: Cada dos meses se hará una presentación al cliente</a:t>
-            </a:r>
-            <a:endParaRPr lang="en-US" sz="2800" dirty="0"/>
-          </a:p>
-          <a:p>
-            <a:endParaRPr lang="en-US" sz="2800" dirty="0"/>
-          </a:p>
-        </p:txBody>
-      </p:sp>
-    </p:spTree>
-  </p:cSld>
-  <p:clrMapOvr>
-    <a:masterClrMapping/>
-  </p:clrMapOvr>
-</p:sld>
-</file>
-
 <file path=ppt/slides/slide9.xml><?xml version="1.0" encoding="utf-8"?>
 <p:sld xmlns:a="http://schemas.openxmlformats.org/drawingml/2006/main" xmlns:r="http://schemas.openxmlformats.org/officeDocument/2006/relationships" xmlns:p="http://schemas.openxmlformats.org/presentationml/2006/main">
   <p:cSld>
@@ -8161,10 +5402,18 @@
           <a:lstStyle/>
           <a:p>
             <a:r>
-              <a:rPr lang="es-ES" dirty="0" smtClean="0"/>
-              <a:t>Estimación</a:t>
-            </a:r>
-            <a:endParaRPr lang="en-US" dirty="0"/>
+              <a:rPr lang="es-AR" smtClean="0"/>
+              <a:t>Forma de Trabajo</a:t>
+            </a:r>
+            <a:r>
+              <a:rPr lang="es-AR" smtClean="0"/>
+              <a:t>: </a:t>
+            </a:r>
+            <a:r>
+              <a:rPr lang="es-AR" smtClean="0"/>
+              <a:t>Scrum</a:t>
+            </a:r>
+            <a:endParaRPr lang="es-AR"/>
           </a:p>
         </p:txBody>
       </p:sp>
@@ -8178,12 +5427,145 @@
             <p:ph idx="1"/>
           </p:nvPr>
         </p:nvSpPr>
-        <p:spPr/>
+        <p:spPr>
+          <a:xfrm>
+            <a:off x="539750" y="1700213"/>
+            <a:ext cx="8451850" cy="4752975"/>
+          </a:xfrm>
+        </p:spPr>
         <p:txBody>
           <a:bodyPr/>
           <a:lstStyle/>
           <a:p>
-            <a:endParaRPr lang="en-US"/>
+            <a:pPr lvl="0"/>
+            <a:r>
+              <a:rPr lang="es-AR" sz="2800" b="1" smtClean="0"/>
+              <a:t>Duración </a:t>
+            </a:r>
+            <a:r>
+              <a:rPr lang="es-AR" sz="2800" b="1" smtClean="0"/>
+              <a:t>del </a:t>
+            </a:r>
+            <a:r>
+              <a:rPr lang="es-AR" sz="2800" b="1" smtClean="0"/>
+              <a:t>Sprint</a:t>
+            </a:r>
+            <a:r>
+              <a:rPr lang="es-AR" sz="2800" smtClean="0"/>
+              <a:t>: 1 </a:t>
+            </a:r>
+            <a:r>
+              <a:rPr lang="es-AR" sz="2800" smtClean="0"/>
+              <a:t>mes</a:t>
+            </a:r>
+            <a:r>
+              <a:rPr lang="es-AR" sz="2800" smtClean="0"/>
+              <a:t>. </a:t>
+            </a:r>
+            <a:endParaRPr lang="es-AR" sz="2800" smtClean="0"/>
+          </a:p>
+          <a:p>
+            <a:pPr lvl="0"/>
+            <a:r>
+              <a:rPr lang="es-AR" sz="2800" b="1" smtClean="0"/>
+              <a:t>Daily </a:t>
+            </a:r>
+            <a:r>
+              <a:rPr lang="es-AR" sz="2800" b="1" smtClean="0"/>
+              <a:t>meeting</a:t>
+            </a:r>
+            <a:r>
+              <a:rPr lang="es-AR" sz="2800" smtClean="0"/>
+              <a:t>: 2 por semana </a:t>
+            </a:r>
+            <a:endParaRPr lang="es-AR" sz="2800" smtClean="0"/>
+          </a:p>
+          <a:p>
+            <a:pPr lvl="0"/>
+            <a:r>
+              <a:rPr lang="es-AR" sz="2800" b="1" smtClean="0"/>
+              <a:t>Planning </a:t>
+            </a:r>
+            <a:r>
+              <a:rPr lang="es-AR" sz="2800" b="1" smtClean="0"/>
+              <a:t>Meeting</a:t>
+            </a:r>
+            <a:r>
+              <a:rPr lang="es-AR" sz="2800" smtClean="0"/>
+              <a:t>: al comienzo de cada iteración para planificar el </a:t>
+            </a:r>
+            <a:r>
+              <a:rPr lang="es-AR" sz="2800" smtClean="0"/>
+              <a:t>Sprint</a:t>
+            </a:r>
+            <a:r>
+              <a:rPr lang="es-AR" sz="2800" smtClean="0"/>
+              <a:t>. </a:t>
+            </a:r>
+            <a:endParaRPr lang="es-AR" sz="2800" smtClean="0"/>
+          </a:p>
+          <a:p>
+            <a:pPr lvl="0"/>
+            <a:r>
+              <a:rPr lang="es-AR" sz="2800" b="1" smtClean="0"/>
+              <a:t>Sprint </a:t>
+            </a:r>
+            <a:r>
+              <a:rPr lang="es-AR" sz="2800" b="1" smtClean="0"/>
+              <a:t>Retrospective</a:t>
+            </a:r>
+            <a:r>
+              <a:rPr lang="es-AR" sz="2800" smtClean="0"/>
+              <a:t>: al finalizar cada Sprint </a:t>
+            </a:r>
+            <a:endParaRPr lang="es-AR" sz="2800" smtClean="0"/>
+          </a:p>
+          <a:p>
+            <a:pPr lvl="0"/>
+            <a:r>
+              <a:rPr lang="es-AR" sz="2800" b="1" smtClean="0"/>
+              <a:t>Comunicación</a:t>
+            </a:r>
+            <a:r>
+              <a:rPr lang="es-AR" sz="2800" smtClean="0"/>
+              <a:t>: comunicación con el tutor será semanal y a través de </a:t>
+            </a:r>
+            <a:r>
+              <a:rPr lang="es-AR" sz="2800" smtClean="0"/>
+              <a:t>Ludmila</a:t>
+            </a:r>
+            <a:r>
+              <a:rPr lang="es-AR" sz="2800" smtClean="0"/>
+              <a:t>. El se usa como método de comunicación no </a:t>
+            </a:r>
+            <a:r>
+              <a:rPr lang="es-AR" sz="2800" smtClean="0"/>
+              <a:t>crítica.</a:t>
+            </a:r>
+            <a:endParaRPr lang="es-AR" sz="2800" smtClean="0"/>
+          </a:p>
+          <a:p>
+            <a:pPr lvl="0"/>
+            <a:r>
+              <a:rPr lang="es-AR" sz="2800" b="1" smtClean="0"/>
+              <a:t>Entregas al </a:t>
+            </a:r>
+            <a:r>
+              <a:rPr lang="es-AR" sz="2800" b="1" smtClean="0"/>
+              <a:t>cliente</a:t>
+            </a:r>
+            <a:r>
+              <a:rPr lang="es-AR" sz="2800" smtClean="0"/>
+              <a:t>: Cada dos meses se hará una presentación al </a:t>
+            </a:r>
+            <a:r>
+              <a:rPr lang="es-AR" sz="2800" smtClean="0"/>
+              <a:t>cliente</a:t>
+            </a:r>
+            <a:endParaRPr lang="es-AR" sz="2800" smtClean="0"/>
+          </a:p>
+          <a:p>
+            <a:endParaRPr lang="es-AR" sz="2800"/>
           </a:p>
         </p:txBody>
       </p:sp>

</xml_diff>